<commit_message>
Updare Day09 & Day10 & Day11
</commit_message>
<xml_diff>
--- a/source/_assets/ironman.pptx
+++ b/source/_assets/ironman.pptx
@@ -5,10 +5,10 @@
     <p:sldMasterId id="2147483752" r:id="rId4"/>
   </p:sldMasterIdLst>
   <p:notesMasterIdLst>
-    <p:notesMasterId r:id="rId28"/>
+    <p:notesMasterId r:id="rId29"/>
   </p:notesMasterIdLst>
   <p:handoutMasterIdLst>
-    <p:handoutMasterId r:id="rId29"/>
+    <p:handoutMasterId r:id="rId30"/>
   </p:handoutMasterIdLst>
   <p:sldIdLst>
     <p:sldId id="316" r:id="rId5"/>
@@ -34,6 +34,7 @@
     <p:sldId id="337" r:id="rId25"/>
     <p:sldId id="340" r:id="rId26"/>
     <p:sldId id="339" r:id="rId27"/>
+    <p:sldId id="348" r:id="rId28"/>
   </p:sldIdLst>
   <p:sldSz cx="12192000" cy="6858000"/>
   <p:notesSz cx="7099300" cy="10234613"/>
@@ -248,7 +249,7 @@
             <a:fld id="{3CDD3A71-4C75-488C-A8F3-A1F163ED0DB9}" type="datetimeFigureOut">
               <a:rPr lang="en-US" smtClean="0"/>
               <a:pPr/>
-              <a:t>12/25/2017</a:t>
+              <a:t>12/27/2017</a:t>
             </a:fld>
             <a:endParaRPr lang="en-US" dirty="0"/>
           </a:p>
@@ -416,7 +417,7 @@
             <a:fld id="{523CC419-8FB3-4D1C-8127-E63C1A13459D}" type="datetimeFigureOut">
               <a:rPr lang="en-US" smtClean="0"/>
               <a:pPr/>
-              <a:t>12/25/2017</a:t>
+              <a:t>12/27/2017</a:t>
             </a:fld>
             <a:endParaRPr lang="en-US" dirty="0"/>
           </a:p>
@@ -819,7 +820,7 @@
           <a:p>
             <a:fld id="{237FF733-248C-4CF7-A090-89CF012E357B}" type="datetimeFigureOut">
               <a:rPr lang="zh-TW" altLang="en-US" smtClean="0"/>
-              <a:t>2017/12/25</a:t>
+              <a:t>2017/12/27</a:t>
             </a:fld>
             <a:endParaRPr lang="zh-TW" altLang="en-US"/>
           </a:p>
@@ -990,7 +991,7 @@
           <a:p>
             <a:fld id="{237FF733-248C-4CF7-A090-89CF012E357B}" type="datetimeFigureOut">
               <a:rPr lang="zh-TW" altLang="en-US" smtClean="0"/>
-              <a:t>2017/12/25</a:t>
+              <a:t>2017/12/27</a:t>
             </a:fld>
             <a:endParaRPr lang="zh-TW" altLang="en-US"/>
           </a:p>
@@ -1171,7 +1172,7 @@
           <a:p>
             <a:fld id="{237FF733-248C-4CF7-A090-89CF012E357B}" type="datetimeFigureOut">
               <a:rPr lang="zh-TW" altLang="en-US" smtClean="0"/>
-              <a:t>2017/12/25</a:t>
+              <a:t>2017/12/27</a:t>
             </a:fld>
             <a:endParaRPr lang="zh-TW" altLang="en-US"/>
           </a:p>
@@ -1342,7 +1343,7 @@
           <a:p>
             <a:fld id="{237FF733-248C-4CF7-A090-89CF012E357B}" type="datetimeFigureOut">
               <a:rPr lang="zh-TW" altLang="en-US" smtClean="0"/>
-              <a:t>2017/12/25</a:t>
+              <a:t>2017/12/27</a:t>
             </a:fld>
             <a:endParaRPr lang="zh-TW" altLang="en-US"/>
           </a:p>
@@ -1589,7 +1590,7 @@
           <a:p>
             <a:fld id="{237FF733-248C-4CF7-A090-89CF012E357B}" type="datetimeFigureOut">
               <a:rPr lang="zh-TW" altLang="en-US" smtClean="0"/>
-              <a:t>2017/12/25</a:t>
+              <a:t>2017/12/27</a:t>
             </a:fld>
             <a:endParaRPr lang="zh-TW" altLang="en-US"/>
           </a:p>
@@ -1822,7 +1823,7 @@
           <a:p>
             <a:fld id="{237FF733-248C-4CF7-A090-89CF012E357B}" type="datetimeFigureOut">
               <a:rPr lang="zh-TW" altLang="en-US" smtClean="0"/>
-              <a:t>2017/12/25</a:t>
+              <a:t>2017/12/27</a:t>
             </a:fld>
             <a:endParaRPr lang="zh-TW" altLang="en-US"/>
           </a:p>
@@ -2190,7 +2191,7 @@
           <a:p>
             <a:fld id="{237FF733-248C-4CF7-A090-89CF012E357B}" type="datetimeFigureOut">
               <a:rPr lang="zh-TW" altLang="en-US" smtClean="0"/>
-              <a:t>2017/12/25</a:t>
+              <a:t>2017/12/27</a:t>
             </a:fld>
             <a:endParaRPr lang="zh-TW" altLang="en-US"/>
           </a:p>
@@ -2309,7 +2310,7 @@
           <a:p>
             <a:fld id="{237FF733-248C-4CF7-A090-89CF012E357B}" type="datetimeFigureOut">
               <a:rPr lang="zh-TW" altLang="en-US" smtClean="0"/>
-              <a:t>2017/12/25</a:t>
+              <a:t>2017/12/27</a:t>
             </a:fld>
             <a:endParaRPr lang="zh-TW" altLang="en-US"/>
           </a:p>
@@ -2405,7 +2406,7 @@
           <a:p>
             <a:fld id="{237FF733-248C-4CF7-A090-89CF012E357B}" type="datetimeFigureOut">
               <a:rPr lang="zh-TW" altLang="en-US" smtClean="0"/>
-              <a:t>2017/12/25</a:t>
+              <a:t>2017/12/27</a:t>
             </a:fld>
             <a:endParaRPr lang="zh-TW" altLang="en-US"/>
           </a:p>
@@ -2683,7 +2684,7 @@
           <a:p>
             <a:fld id="{237FF733-248C-4CF7-A090-89CF012E357B}" type="datetimeFigureOut">
               <a:rPr lang="zh-TW" altLang="en-US" smtClean="0"/>
-              <a:t>2017/12/25</a:t>
+              <a:t>2017/12/27</a:t>
             </a:fld>
             <a:endParaRPr lang="zh-TW" altLang="en-US"/>
           </a:p>
@@ -2941,7 +2942,7 @@
           <a:p>
             <a:fld id="{237FF733-248C-4CF7-A090-89CF012E357B}" type="datetimeFigureOut">
               <a:rPr lang="zh-TW" altLang="en-US" smtClean="0"/>
-              <a:t>2017/12/25</a:t>
+              <a:t>2017/12/27</a:t>
             </a:fld>
             <a:endParaRPr lang="zh-TW" altLang="en-US"/>
           </a:p>
@@ -3155,7 +3156,7 @@
           <a:p>
             <a:fld id="{237FF733-248C-4CF7-A090-89CF012E357B}" type="datetimeFigureOut">
               <a:rPr lang="zh-TW" altLang="en-US" smtClean="0"/>
-              <a:t>2017/12/25</a:t>
+              <a:t>2017/12/27</a:t>
             </a:fld>
             <a:endParaRPr lang="zh-TW" altLang="en-US"/>
           </a:p>
@@ -7320,13 +7321,7 @@
               <a:rPr lang="zh-TW" altLang="en-US" sz="1200" dirty="0" smtClean="0">
                 <a:ea typeface="微軟正黑體" panose="020B0604030504040204" pitchFamily="34" charset="-120"/>
               </a:rPr>
-              <a:t>我</a:t>
-            </a:r>
-            <a:r>
-              <a:rPr lang="zh-TW" altLang="en-US" sz="1200" dirty="0" smtClean="0">
-                <a:ea typeface="微軟正黑體" panose="020B0604030504040204" pitchFamily="34" charset="-120"/>
-              </a:rPr>
-              <a:t>要 </a:t>
+              <a:t>我要 </a:t>
             </a:r>
             <a:r>
               <a:rPr lang="en-US" altLang="zh-TW" sz="1200" dirty="0" smtClean="0">
@@ -7892,9 +7887,6 @@
               </a:rPr>
               <a:t>/home/about </a:t>
             </a:r>
-            <a:endParaRPr lang="en-US" altLang="zh-TW" sz="1200" b="1" dirty="0">
-              <a:latin typeface="Consolas" panose="020B0609020204030204" pitchFamily="49" charset="0"/>
-            </a:endParaRPr>
           </a:p>
         </p:txBody>
       </p:sp>
@@ -7937,9 +7929,6 @@
               </a:rPr>
               <a:t>/home/about </a:t>
             </a:r>
-            <a:endParaRPr lang="en-US" altLang="zh-TW" sz="1200" b="1" dirty="0">
-              <a:latin typeface="Consolas" panose="020B0609020204030204" pitchFamily="49" charset="0"/>
-            </a:endParaRPr>
           </a:p>
         </p:txBody>
       </p:sp>
@@ -8090,13 +8079,7 @@
               <a:rPr lang="zh-TW" altLang="en-US" sz="1200" dirty="0" smtClean="0">
                 <a:ea typeface="微軟正黑體" panose="020B0604030504040204" pitchFamily="34" charset="-120"/>
               </a:rPr>
-              <a:t>我</a:t>
-            </a:r>
-            <a:r>
-              <a:rPr lang="zh-TW" altLang="en-US" sz="1200" dirty="0" smtClean="0">
-                <a:ea typeface="微軟正黑體" panose="020B0604030504040204" pitchFamily="34" charset="-120"/>
-              </a:rPr>
-              <a:t>要 </a:t>
+              <a:t>我要 </a:t>
             </a:r>
             <a:r>
               <a:rPr lang="en-US" altLang="zh-TW" sz="1200" dirty="0" smtClean="0">
@@ -25145,6 +25128,213 @@
 </p:sld>
 </file>
 
+<file path=ppt/slides/slide24.xml><?xml version="1.0" encoding="utf-8"?>
+<p:sld xmlns:a="http://schemas.openxmlformats.org/drawingml/2006/main" xmlns:r="http://schemas.openxmlformats.org/officeDocument/2006/relationships" xmlns:p="http://schemas.openxmlformats.org/presentationml/2006/main">
+  <p:cSld>
+    <p:spTree>
+      <p:nvGrpSpPr>
+        <p:cNvPr id="1" name=""/>
+        <p:cNvGrpSpPr/>
+        <p:nvPr/>
+      </p:nvGrpSpPr>
+      <p:grpSpPr>
+        <a:xfrm>
+          <a:off x="0" y="0"/>
+          <a:ext cx="0" cy="0"/>
+          <a:chOff x="0" y="0"/>
+          <a:chExt cx="0" cy="0"/>
+        </a:xfrm>
+      </p:grpSpPr>
+      <p:sp>
+        <p:nvSpPr>
+          <p:cNvPr id="8" name="矩形 7"/>
+          <p:cNvSpPr/>
+          <p:nvPr/>
+        </p:nvSpPr>
+        <p:spPr>
+          <a:xfrm>
+            <a:off x="1447799" y="2064000"/>
+            <a:ext cx="5115969" cy="1605884"/>
+          </a:xfrm>
+          <a:prstGeom prst="rect">
+            <a:avLst/>
+          </a:prstGeom>
+        </p:spPr>
+        <p:style>
+          <a:lnRef idx="0">
+            <a:schemeClr val="accent4"/>
+          </a:lnRef>
+          <a:fillRef idx="3">
+            <a:schemeClr val="accent4"/>
+          </a:fillRef>
+          <a:effectRef idx="3">
+            <a:schemeClr val="accent4"/>
+          </a:effectRef>
+          <a:fontRef idx="minor">
+            <a:schemeClr val="lt1"/>
+          </a:fontRef>
+        </p:style>
+        <p:txBody>
+          <a:bodyPr rtlCol="0" anchor="ctr"/>
+          <a:lstStyle/>
+          <a:p>
+            <a:pPr algn="ctr"/>
+            <a:r>
+              <a:rPr lang="en-US" altLang="zh-TW" dirty="0" smtClean="0"/>
+              <a:t>Content</a:t>
+            </a:r>
+            <a:endParaRPr lang="zh-TW" altLang="en-US" dirty="0"/>
+          </a:p>
+        </p:txBody>
+      </p:sp>
+      <p:sp>
+        <p:nvSpPr>
+          <p:cNvPr id="5" name="矩形 4"/>
+          <p:cNvSpPr/>
+          <p:nvPr/>
+        </p:nvSpPr>
+        <p:spPr>
+          <a:xfrm>
+            <a:off x="6934200" y="451058"/>
+            <a:ext cx="5115969" cy="2685884"/>
+          </a:xfrm>
+          <a:prstGeom prst="rect">
+            <a:avLst/>
+          </a:prstGeom>
+          <a:noFill/>
+          <a:ln w="28575">
+            <a:prstDash val="lgDash"/>
+          </a:ln>
+        </p:spPr>
+        <p:style>
+          <a:lnRef idx="2">
+            <a:schemeClr val="dk1">
+              <a:shade val="50000"/>
+            </a:schemeClr>
+          </a:lnRef>
+          <a:fillRef idx="1">
+            <a:schemeClr val="dk1"/>
+          </a:fillRef>
+          <a:effectRef idx="0">
+            <a:schemeClr val="dk1"/>
+          </a:effectRef>
+          <a:fontRef idx="minor">
+            <a:schemeClr val="lt1"/>
+          </a:fontRef>
+        </p:style>
+        <p:txBody>
+          <a:bodyPr rtlCol="0" anchor="ctr"/>
+          <a:lstStyle/>
+          <a:p>
+            <a:pPr algn="ctr"/>
+            <a:endParaRPr lang="zh-TW" altLang="en-US"/>
+          </a:p>
+        </p:txBody>
+      </p:sp>
+      <p:sp>
+        <p:nvSpPr>
+          <p:cNvPr id="6" name="矩形 5"/>
+          <p:cNvSpPr/>
+          <p:nvPr/>
+        </p:nvSpPr>
+        <p:spPr>
+          <a:xfrm>
+            <a:off x="1447799" y="1524000"/>
+            <a:ext cx="5115969" cy="540000"/>
+          </a:xfrm>
+          <a:prstGeom prst="rect">
+            <a:avLst/>
+          </a:prstGeom>
+        </p:spPr>
+        <p:style>
+          <a:lnRef idx="0">
+            <a:schemeClr val="accent1"/>
+          </a:lnRef>
+          <a:fillRef idx="3">
+            <a:schemeClr val="accent1"/>
+          </a:fillRef>
+          <a:effectRef idx="3">
+            <a:schemeClr val="accent1"/>
+          </a:effectRef>
+          <a:fontRef idx="minor">
+            <a:schemeClr val="lt1"/>
+          </a:fontRef>
+        </p:style>
+        <p:txBody>
+          <a:bodyPr rtlCol="0" anchor="ctr"/>
+          <a:lstStyle/>
+          <a:p>
+            <a:pPr algn="ctr"/>
+            <a:r>
+              <a:rPr lang="en-US" altLang="zh-TW" dirty="0" smtClean="0"/>
+              <a:t>Header</a:t>
+            </a:r>
+            <a:endParaRPr lang="zh-TW" altLang="en-US" dirty="0"/>
+          </a:p>
+        </p:txBody>
+      </p:sp>
+      <p:sp>
+        <p:nvSpPr>
+          <p:cNvPr id="7" name="矩形 6"/>
+          <p:cNvSpPr/>
+          <p:nvPr/>
+        </p:nvSpPr>
+        <p:spPr>
+          <a:xfrm>
+            <a:off x="1447799" y="3669884"/>
+            <a:ext cx="5115969" cy="540000"/>
+          </a:xfrm>
+          <a:prstGeom prst="rect">
+            <a:avLst/>
+          </a:prstGeom>
+        </p:spPr>
+        <p:style>
+          <a:lnRef idx="0">
+            <a:schemeClr val="accent1"/>
+          </a:lnRef>
+          <a:fillRef idx="3">
+            <a:schemeClr val="accent1"/>
+          </a:fillRef>
+          <a:effectRef idx="3">
+            <a:schemeClr val="accent1"/>
+          </a:effectRef>
+          <a:fontRef idx="minor">
+            <a:schemeClr val="lt1"/>
+          </a:fontRef>
+        </p:style>
+        <p:txBody>
+          <a:bodyPr rtlCol="0" anchor="ctr"/>
+          <a:lstStyle/>
+          <a:p>
+            <a:pPr algn="ctr"/>
+            <a:r>
+              <a:rPr lang="en-US" altLang="zh-TW" dirty="0" smtClean="0"/>
+              <a:t>Footer</a:t>
+            </a:r>
+            <a:endParaRPr lang="zh-TW" altLang="en-US" dirty="0"/>
+          </a:p>
+        </p:txBody>
+      </p:sp>
+    </p:spTree>
+    <p:extLst>
+      <p:ext uri="{BB962C8B-B14F-4D97-AF65-F5344CB8AC3E}">
+        <p14:creationId xmlns:p14="http://schemas.microsoft.com/office/powerpoint/2010/main" val="2564765899"/>
+      </p:ext>
+    </p:extLst>
+  </p:cSld>
+  <p:clrMapOvr>
+    <a:masterClrMapping/>
+  </p:clrMapOvr>
+  <p:timing>
+    <p:tnLst>
+      <p:par>
+        <p:cTn id="1" dur="indefinite" restart="never" nodeType="tmRoot"/>
+      </p:par>
+    </p:tnLst>
+  </p:timing>
+</p:sld>
+</file>
+
 <file path=ppt/slides/slide3.xml><?xml version="1.0" encoding="utf-8"?>
 <p:sld xmlns:a="http://schemas.openxmlformats.org/drawingml/2006/main" xmlns:r="http://schemas.openxmlformats.org/officeDocument/2006/relationships" xmlns:p="http://schemas.openxmlformats.org/presentationml/2006/main">
   <p:cSld>
@@ -35362,18 +35552,18 @@
 </file>
 
 <file path=customXml/item1.xml><?xml version="1.0" encoding="utf-8"?>
-<p:properties xmlns:p="http://schemas.microsoft.com/office/2006/metadata/properties" xmlns:xsi="http://www.w3.org/2001/XMLSchema-instance">
-  <documentManagement/>
-</p:properties>
-</file>
-
-<file path=customXml/item2.xml><?xml version="1.0" encoding="utf-8"?>
 <?mso-contentType ?>
 <FormTemplates xmlns="http://schemas.microsoft.com/sharepoint/v3/contenttype/forms">
   <Display>DocumentLibraryForm</Display>
   <Edit>DocumentLibraryForm</Edit>
   <New>DocumentLibraryForm</New>
 </FormTemplates>
+</file>
+
+<file path=customXml/item2.xml><?xml version="1.0" encoding="utf-8"?>
+<p:properties xmlns:p="http://schemas.microsoft.com/office/2006/metadata/properties" xmlns:xsi="http://www.w3.org/2001/XMLSchema-instance">
+  <documentManagement/>
+</p:properties>
 </file>
 
 <file path=customXml/item3.xml><?xml version="1.0" encoding="utf-8"?>
@@ -35426,6 +35616,14 @@
 </file>
 
 <file path=customXml/itemProps1.xml><?xml version="1.0" encoding="utf-8"?>
+<ds:datastoreItem xmlns:ds="http://schemas.openxmlformats.org/officeDocument/2006/customXml" ds:itemID="{A1770BF7-49D5-46D6-8B76-1D8AF290B450}">
+  <ds:schemaRefs>
+    <ds:schemaRef ds:uri="http://schemas.microsoft.com/sharepoint/v3/contenttype/forms"/>
+  </ds:schemaRefs>
+</ds:datastoreItem>
+</file>
+
+<file path=customXml/itemProps2.xml><?xml version="1.0" encoding="utf-8"?>
 <ds:datastoreItem xmlns:ds="http://schemas.openxmlformats.org/officeDocument/2006/customXml" ds:itemID="{892A9AA9-F261-48C5-9DFB-0929A9F0E540}">
   <ds:schemaRefs>
     <ds:schemaRef ds:uri="http://purl.org/dc/dcmitype/"/>
@@ -35435,14 +35633,6 @@
     <ds:schemaRef ds:uri="http://www.w3.org/XML/1998/namespace"/>
     <ds:schemaRef ds:uri="http://purl.org/dc/terms/"/>
     <ds:schemaRef ds:uri="http://schemas.openxmlformats.org/package/2006/metadata/core-properties"/>
-  </ds:schemaRefs>
-</ds:datastoreItem>
-</file>
-
-<file path=customXml/itemProps2.xml><?xml version="1.0" encoding="utf-8"?>
-<ds:datastoreItem xmlns:ds="http://schemas.openxmlformats.org/officeDocument/2006/customXml" ds:itemID="{A1770BF7-49D5-46D6-8B76-1D8AF290B450}">
-  <ds:schemaRefs>
-    <ds:schemaRef ds:uri="http://schemas.microsoft.com/sharepoint/v3/contenttype/forms"/>
   </ds:schemaRefs>
 </ds:datastoreItem>
 </file>

</xml_diff>

<commit_message>
Update Day28, Day29, Day30
</commit_message>
<xml_diff>
--- a/source/_assets/ironman.pptx
+++ b/source/_assets/ironman.pptx
@@ -5,10 +5,10 @@
     <p:sldMasterId id="2147483752" r:id="rId4"/>
   </p:sldMasterIdLst>
   <p:notesMasterIdLst>
-    <p:notesMasterId r:id="rId31"/>
+    <p:notesMasterId r:id="rId32"/>
   </p:notesMasterIdLst>
   <p:handoutMasterIdLst>
-    <p:handoutMasterId r:id="rId32"/>
+    <p:handoutMasterId r:id="rId33"/>
   </p:handoutMasterIdLst>
   <p:sldIdLst>
     <p:sldId id="316" r:id="rId5"/>
@@ -37,6 +37,7 @@
     <p:sldId id="348" r:id="rId28"/>
     <p:sldId id="350" r:id="rId29"/>
     <p:sldId id="351" r:id="rId30"/>
+    <p:sldId id="352" r:id="rId31"/>
   </p:sldIdLst>
   <p:sldSz cx="12192000" cy="6858000"/>
   <p:notesSz cx="7099300" cy="10234613"/>
@@ -251,7 +252,7 @@
             <a:fld id="{3CDD3A71-4C75-488C-A8F3-A1F163ED0DB9}" type="datetimeFigureOut">
               <a:rPr lang="en-US" smtClean="0"/>
               <a:pPr/>
-              <a:t>1/12/2018</a:t>
+              <a:t>1/15/2018</a:t>
             </a:fld>
             <a:endParaRPr lang="en-US" dirty="0"/>
           </a:p>
@@ -419,7 +420,7 @@
             <a:fld id="{523CC419-8FB3-4D1C-8127-E63C1A13459D}" type="datetimeFigureOut">
               <a:rPr lang="en-US" smtClean="0"/>
               <a:pPr/>
-              <a:t>1/12/2018</a:t>
+              <a:t>1/15/2018</a:t>
             </a:fld>
             <a:endParaRPr lang="en-US" dirty="0"/>
           </a:p>
@@ -822,7 +823,7 @@
           <a:p>
             <a:fld id="{237FF733-248C-4CF7-A090-89CF012E357B}" type="datetimeFigureOut">
               <a:rPr lang="zh-TW" altLang="en-US" smtClean="0"/>
-              <a:t>2018/1/12</a:t>
+              <a:t>2018/1/15</a:t>
             </a:fld>
             <a:endParaRPr lang="zh-TW" altLang="en-US"/>
           </a:p>
@@ -993,7 +994,7 @@
           <a:p>
             <a:fld id="{237FF733-248C-4CF7-A090-89CF012E357B}" type="datetimeFigureOut">
               <a:rPr lang="zh-TW" altLang="en-US" smtClean="0"/>
-              <a:t>2018/1/12</a:t>
+              <a:t>2018/1/15</a:t>
             </a:fld>
             <a:endParaRPr lang="zh-TW" altLang="en-US"/>
           </a:p>
@@ -1174,7 +1175,7 @@
           <a:p>
             <a:fld id="{237FF733-248C-4CF7-A090-89CF012E357B}" type="datetimeFigureOut">
               <a:rPr lang="zh-TW" altLang="en-US" smtClean="0"/>
-              <a:t>2018/1/12</a:t>
+              <a:t>2018/1/15</a:t>
             </a:fld>
             <a:endParaRPr lang="zh-TW" altLang="en-US"/>
           </a:p>
@@ -1345,7 +1346,7 @@
           <a:p>
             <a:fld id="{237FF733-248C-4CF7-A090-89CF012E357B}" type="datetimeFigureOut">
               <a:rPr lang="zh-TW" altLang="en-US" smtClean="0"/>
-              <a:t>2018/1/12</a:t>
+              <a:t>2018/1/15</a:t>
             </a:fld>
             <a:endParaRPr lang="zh-TW" altLang="en-US"/>
           </a:p>
@@ -1592,7 +1593,7 @@
           <a:p>
             <a:fld id="{237FF733-248C-4CF7-A090-89CF012E357B}" type="datetimeFigureOut">
               <a:rPr lang="zh-TW" altLang="en-US" smtClean="0"/>
-              <a:t>2018/1/12</a:t>
+              <a:t>2018/1/15</a:t>
             </a:fld>
             <a:endParaRPr lang="zh-TW" altLang="en-US"/>
           </a:p>
@@ -1825,7 +1826,7 @@
           <a:p>
             <a:fld id="{237FF733-248C-4CF7-A090-89CF012E357B}" type="datetimeFigureOut">
               <a:rPr lang="zh-TW" altLang="en-US" smtClean="0"/>
-              <a:t>2018/1/12</a:t>
+              <a:t>2018/1/15</a:t>
             </a:fld>
             <a:endParaRPr lang="zh-TW" altLang="en-US"/>
           </a:p>
@@ -2193,7 +2194,7 @@
           <a:p>
             <a:fld id="{237FF733-248C-4CF7-A090-89CF012E357B}" type="datetimeFigureOut">
               <a:rPr lang="zh-TW" altLang="en-US" smtClean="0"/>
-              <a:t>2018/1/12</a:t>
+              <a:t>2018/1/15</a:t>
             </a:fld>
             <a:endParaRPr lang="zh-TW" altLang="en-US"/>
           </a:p>
@@ -2312,7 +2313,7 @@
           <a:p>
             <a:fld id="{237FF733-248C-4CF7-A090-89CF012E357B}" type="datetimeFigureOut">
               <a:rPr lang="zh-TW" altLang="en-US" smtClean="0"/>
-              <a:t>2018/1/12</a:t>
+              <a:t>2018/1/15</a:t>
             </a:fld>
             <a:endParaRPr lang="zh-TW" altLang="en-US"/>
           </a:p>
@@ -2408,7 +2409,7 @@
           <a:p>
             <a:fld id="{237FF733-248C-4CF7-A090-89CF012E357B}" type="datetimeFigureOut">
               <a:rPr lang="zh-TW" altLang="en-US" smtClean="0"/>
-              <a:t>2018/1/12</a:t>
+              <a:t>2018/1/15</a:t>
             </a:fld>
             <a:endParaRPr lang="zh-TW" altLang="en-US"/>
           </a:p>
@@ -2686,7 +2687,7 @@
           <a:p>
             <a:fld id="{237FF733-248C-4CF7-A090-89CF012E357B}" type="datetimeFigureOut">
               <a:rPr lang="zh-TW" altLang="en-US" smtClean="0"/>
-              <a:t>2018/1/12</a:t>
+              <a:t>2018/1/15</a:t>
             </a:fld>
             <a:endParaRPr lang="zh-TW" altLang="en-US"/>
           </a:p>
@@ -2944,7 +2945,7 @@
           <a:p>
             <a:fld id="{237FF733-248C-4CF7-A090-89CF012E357B}" type="datetimeFigureOut">
               <a:rPr lang="zh-TW" altLang="en-US" smtClean="0"/>
-              <a:t>2018/1/12</a:t>
+              <a:t>2018/1/15</a:t>
             </a:fld>
             <a:endParaRPr lang="zh-TW" altLang="en-US"/>
           </a:p>
@@ -3158,7 +3159,7 @@
           <a:p>
             <a:fld id="{237FF733-248C-4CF7-A090-89CF012E357B}" type="datetimeFigureOut">
               <a:rPr lang="zh-TW" altLang="en-US" smtClean="0"/>
-              <a:t>2018/1/12</a:t>
+              <a:t>2018/1/15</a:t>
             </a:fld>
             <a:endParaRPr lang="zh-TW" altLang="en-US"/>
           </a:p>
@@ -26878,11 +26879,7 @@
               <a:pPr algn="ctr"/>
               <a:r>
                 <a:rPr lang="en-US" altLang="zh-TW" dirty="0" smtClean="0"/>
-                <a:t>Attacker’s </a:t>
-              </a:r>
-              <a:r>
-                <a:rPr lang="en-US" altLang="zh-TW" dirty="0" smtClean="0"/>
-                <a:t>Server</a:t>
+                <a:t>Attacker’s Server</a:t>
               </a:r>
               <a:endParaRPr lang="zh-TW" altLang="en-US" dirty="0"/>
             </a:p>
@@ -27582,6 +27579,1811 @@
             </p:seq>
           </p:childTnLst>
         </p:cTn>
+      </p:par>
+    </p:tnLst>
+  </p:timing>
+</p:sld>
+</file>
+
+<file path=ppt/slides/slide27.xml><?xml version="1.0" encoding="utf-8"?>
+<p:sld xmlns:a="http://schemas.openxmlformats.org/drawingml/2006/main" xmlns:r="http://schemas.openxmlformats.org/officeDocument/2006/relationships" xmlns:p="http://schemas.openxmlformats.org/presentationml/2006/main">
+  <p:cSld>
+    <p:spTree>
+      <p:nvGrpSpPr>
+        <p:cNvPr id="1" name=""/>
+        <p:cNvGrpSpPr/>
+        <p:nvPr/>
+      </p:nvGrpSpPr>
+      <p:grpSpPr>
+        <a:xfrm>
+          <a:off x="0" y="0"/>
+          <a:ext cx="0" cy="0"/>
+          <a:chOff x="0" y="0"/>
+          <a:chExt cx="0" cy="0"/>
+        </a:xfrm>
+      </p:grpSpPr>
+      <p:cxnSp>
+        <p:nvCxnSpPr>
+          <p:cNvPr id="59" name="肘形接點 58"/>
+          <p:cNvCxnSpPr>
+            <a:stCxn id="37" idx="3"/>
+          </p:cNvCxnSpPr>
+          <p:nvPr/>
+        </p:nvCxnSpPr>
+        <p:spPr>
+          <a:xfrm flipH="1" flipV="1">
+            <a:off x="941294" y="672347"/>
+            <a:ext cx="1736976" cy="1504211"/>
+          </a:xfrm>
+          <a:prstGeom prst="bentConnector3">
+            <a:avLst>
+              <a:gd name="adj1" fmla="val 17343"/>
+            </a:avLst>
+          </a:prstGeom>
+          <a:ln w="38100">
+            <a:solidFill>
+              <a:schemeClr val="tx1"/>
+            </a:solidFill>
+            <a:tailEnd type="triangle"/>
+          </a:ln>
+        </p:spPr>
+        <p:style>
+          <a:lnRef idx="1">
+            <a:schemeClr val="accent1"/>
+          </a:lnRef>
+          <a:fillRef idx="0">
+            <a:schemeClr val="accent1"/>
+          </a:fillRef>
+          <a:effectRef idx="0">
+            <a:schemeClr val="accent1"/>
+          </a:effectRef>
+          <a:fontRef idx="minor">
+            <a:schemeClr val="tx1"/>
+          </a:fontRef>
+        </p:style>
+      </p:cxnSp>
+      <p:sp>
+        <p:nvSpPr>
+          <p:cNvPr id="5" name="矩形 4"/>
+          <p:cNvSpPr/>
+          <p:nvPr/>
+        </p:nvSpPr>
+        <p:spPr>
+          <a:xfrm>
+            <a:off x="5893043" y="79176"/>
+            <a:ext cx="5115969" cy="2685884"/>
+          </a:xfrm>
+          <a:prstGeom prst="rect">
+            <a:avLst/>
+          </a:prstGeom>
+          <a:noFill/>
+          <a:ln w="28575">
+            <a:prstDash val="lgDash"/>
+          </a:ln>
+        </p:spPr>
+        <p:style>
+          <a:lnRef idx="2">
+            <a:schemeClr val="dk1">
+              <a:shade val="50000"/>
+            </a:schemeClr>
+          </a:lnRef>
+          <a:fillRef idx="1">
+            <a:schemeClr val="dk1"/>
+          </a:fillRef>
+          <a:effectRef idx="0">
+            <a:schemeClr val="dk1"/>
+          </a:effectRef>
+          <a:fontRef idx="minor">
+            <a:schemeClr val="lt1"/>
+          </a:fontRef>
+        </p:style>
+        <p:txBody>
+          <a:bodyPr rtlCol="0" anchor="ctr"/>
+          <a:lstStyle/>
+          <a:p>
+            <a:pPr algn="ctr"/>
+            <a:endParaRPr lang="zh-TW" altLang="en-US"/>
+          </a:p>
+        </p:txBody>
+      </p:sp>
+      <p:grpSp>
+        <p:nvGrpSpPr>
+          <p:cNvPr id="7" name="群組 6"/>
+          <p:cNvGrpSpPr/>
+          <p:nvPr/>
+        </p:nvGrpSpPr>
+        <p:grpSpPr>
+          <a:xfrm>
+            <a:off x="4070952" y="1761573"/>
+            <a:ext cx="1194060" cy="1210227"/>
+            <a:chOff x="941473" y="1579980"/>
+            <a:chExt cx="1769199" cy="1869369"/>
+          </a:xfrm>
+        </p:grpSpPr>
+        <p:pic>
+          <p:nvPicPr>
+            <p:cNvPr id="8" name="圖片 7"/>
+            <p:cNvPicPr>
+              <a:picLocks noChangeAspect="1"/>
+            </p:cNvPicPr>
+            <p:nvPr/>
+          </p:nvPicPr>
+          <p:blipFill>
+            <a:blip r:embed="rId2">
+              <a:extLst>
+                <a:ext uri="{28A0092B-C50C-407E-A947-70E740481C1C}">
+                  <a14:useLocalDpi xmlns:a14="http://schemas.microsoft.com/office/drawing/2010/main" val="0"/>
+                </a:ext>
+              </a:extLst>
+            </a:blip>
+            <a:stretch>
+              <a:fillRect/>
+            </a:stretch>
+          </p:blipFill>
+          <p:spPr>
+            <a:xfrm>
+              <a:off x="1241656" y="1579980"/>
+              <a:ext cx="1156879" cy="1287657"/>
+            </a:xfrm>
+            <a:prstGeom prst="rect">
+              <a:avLst/>
+            </a:prstGeom>
+          </p:spPr>
+        </p:pic>
+        <p:sp>
+          <p:nvSpPr>
+            <p:cNvPr id="9" name="文字方塊 8"/>
+            <p:cNvSpPr txBox="1"/>
+            <p:nvPr/>
+          </p:nvSpPr>
+          <p:spPr>
+            <a:xfrm>
+              <a:off x="941473" y="2878863"/>
+              <a:ext cx="1769199" cy="570486"/>
+            </a:xfrm>
+            <a:prstGeom prst="rect">
+              <a:avLst/>
+            </a:prstGeom>
+            <a:noFill/>
+          </p:spPr>
+          <p:txBody>
+            <a:bodyPr wrap="square" rtlCol="0">
+              <a:spAutoFit/>
+            </a:bodyPr>
+            <a:lstStyle/>
+            <a:p>
+              <a:pPr algn="ctr"/>
+              <a:r>
+                <a:rPr lang="en-US" altLang="zh-TW" dirty="0" smtClean="0"/>
+                <a:t>Website</a:t>
+              </a:r>
+              <a:endParaRPr lang="zh-TW" altLang="en-US" dirty="0"/>
+            </a:p>
+          </p:txBody>
+        </p:sp>
+      </p:grpSp>
+      <p:grpSp>
+        <p:nvGrpSpPr>
+          <p:cNvPr id="3" name="群組 2"/>
+          <p:cNvGrpSpPr/>
+          <p:nvPr/>
+        </p:nvGrpSpPr>
+        <p:grpSpPr>
+          <a:xfrm>
+            <a:off x="2154433" y="5203051"/>
+            <a:ext cx="1244380" cy="864807"/>
+            <a:chOff x="4301463" y="4218085"/>
+            <a:chExt cx="1244380" cy="864807"/>
+          </a:xfrm>
+        </p:grpSpPr>
+        <p:pic>
+          <p:nvPicPr>
+            <p:cNvPr id="22" name="圖片 21"/>
+            <p:cNvPicPr>
+              <a:picLocks noChangeAspect="1"/>
+            </p:cNvPicPr>
+            <p:nvPr/>
+          </p:nvPicPr>
+          <p:blipFill>
+            <a:blip r:embed="rId3">
+              <a:extLst>
+                <a:ext uri="{28A0092B-C50C-407E-A947-70E740481C1C}">
+                  <a14:useLocalDpi xmlns:a14="http://schemas.microsoft.com/office/drawing/2010/main" val="0"/>
+                </a:ext>
+              </a:extLst>
+            </a:blip>
+            <a:stretch>
+              <a:fillRect/>
+            </a:stretch>
+          </p:blipFill>
+          <p:spPr>
+            <a:xfrm>
+              <a:off x="4316081" y="4362892"/>
+              <a:ext cx="720000" cy="720000"/>
+            </a:xfrm>
+            <a:prstGeom prst="rect">
+              <a:avLst/>
+            </a:prstGeom>
+          </p:spPr>
+        </p:pic>
+        <p:sp>
+          <p:nvSpPr>
+            <p:cNvPr id="25" name="文字方塊 24"/>
+            <p:cNvSpPr txBox="1"/>
+            <p:nvPr/>
+          </p:nvSpPr>
+          <p:spPr>
+            <a:xfrm>
+              <a:off x="4301463" y="4218085"/>
+              <a:ext cx="1244380" cy="276999"/>
+            </a:xfrm>
+            <a:prstGeom prst="rect">
+              <a:avLst/>
+            </a:prstGeom>
+            <a:noFill/>
+          </p:spPr>
+          <p:txBody>
+            <a:bodyPr wrap="none" rtlCol="0">
+              <a:spAutoFit/>
+            </a:bodyPr>
+            <a:lstStyle/>
+            <a:p>
+              <a:r>
+                <a:rPr lang="en-US" altLang="zh-TW" sz="1200" b="1" dirty="0" smtClean="0">
+                  <a:latin typeface="微軟正黑體" panose="020B0604030504040204" pitchFamily="34" charset="-120"/>
+                  <a:ea typeface="微軟正黑體" panose="020B0604030504040204" pitchFamily="34" charset="-120"/>
+                </a:rPr>
+                <a:t>Response </a:t>
+              </a:r>
+              <a:r>
+                <a:rPr lang="zh-TW" altLang="en-US" sz="1200" b="1" dirty="0" smtClean="0">
+                  <a:latin typeface="微軟正黑體" panose="020B0604030504040204" pitchFamily="34" charset="-120"/>
+                  <a:ea typeface="微軟正黑體" panose="020B0604030504040204" pitchFamily="34" charset="-120"/>
+                </a:rPr>
+                <a:t>快取</a:t>
+              </a:r>
+              <a:endParaRPr lang="zh-TW" altLang="en-US" sz="1200" b="1" dirty="0">
+                <a:latin typeface="微軟正黑體" panose="020B0604030504040204" pitchFamily="34" charset="-120"/>
+                <a:ea typeface="微軟正黑體" panose="020B0604030504040204" pitchFamily="34" charset="-120"/>
+              </a:endParaRPr>
+            </a:p>
+          </p:txBody>
+        </p:sp>
+      </p:grpSp>
+      <p:sp>
+        <p:nvSpPr>
+          <p:cNvPr id="27" name="文字方塊 26"/>
+          <p:cNvSpPr txBox="1"/>
+          <p:nvPr/>
+        </p:nvSpPr>
+        <p:spPr>
+          <a:xfrm>
+            <a:off x="207424" y="304800"/>
+            <a:ext cx="954107" cy="276999"/>
+          </a:xfrm>
+          <a:prstGeom prst="rect">
+            <a:avLst/>
+          </a:prstGeom>
+          <a:noFill/>
+        </p:spPr>
+        <p:txBody>
+          <a:bodyPr wrap="none" rtlCol="0">
+            <a:spAutoFit/>
+          </a:bodyPr>
+          <a:lstStyle/>
+          <a:p>
+            <a:r>
+              <a:rPr lang="zh-TW" altLang="en-US" sz="1200" b="1" dirty="0" smtClean="0">
+                <a:latin typeface="微軟正黑體" panose="020B0604030504040204" pitchFamily="34" charset="-120"/>
+                <a:ea typeface="微軟正黑體" panose="020B0604030504040204" pitchFamily="34" charset="-120"/>
+              </a:rPr>
+              <a:t>瀏覽器</a:t>
+            </a:r>
+            <a:r>
+              <a:rPr lang="zh-TW" altLang="en-US" sz="1200" b="1" dirty="0">
+                <a:latin typeface="微軟正黑體" panose="020B0604030504040204" pitchFamily="34" charset="-120"/>
+                <a:ea typeface="微軟正黑體" panose="020B0604030504040204" pitchFamily="34" charset="-120"/>
+              </a:rPr>
+              <a:t>暫</a:t>
+            </a:r>
+            <a:r>
+              <a:rPr lang="zh-TW" altLang="en-US" sz="1200" b="1" dirty="0" smtClean="0">
+                <a:latin typeface="微軟正黑體" panose="020B0604030504040204" pitchFamily="34" charset="-120"/>
+                <a:ea typeface="微軟正黑體" panose="020B0604030504040204" pitchFamily="34" charset="-120"/>
+              </a:rPr>
+              <a:t>存</a:t>
+            </a:r>
+            <a:endParaRPr lang="zh-TW" altLang="en-US" sz="1200" b="1" dirty="0">
+              <a:latin typeface="微軟正黑體" panose="020B0604030504040204" pitchFamily="34" charset="-120"/>
+              <a:ea typeface="微軟正黑體" panose="020B0604030504040204" pitchFamily="34" charset="-120"/>
+            </a:endParaRPr>
+          </a:p>
+        </p:txBody>
+      </p:sp>
+      <p:grpSp>
+        <p:nvGrpSpPr>
+          <p:cNvPr id="30" name="群組 29"/>
+          <p:cNvGrpSpPr/>
+          <p:nvPr/>
+        </p:nvGrpSpPr>
+        <p:grpSpPr>
+          <a:xfrm>
+            <a:off x="1599615" y="1783252"/>
+            <a:ext cx="1142999" cy="1035570"/>
+            <a:chOff x="1066801" y="2626549"/>
+            <a:chExt cx="1695654" cy="1536281"/>
+          </a:xfrm>
+        </p:grpSpPr>
+        <p:sp>
+          <p:nvSpPr>
+            <p:cNvPr id="32" name="矩形 31"/>
+            <p:cNvSpPr/>
+            <p:nvPr/>
+          </p:nvSpPr>
+          <p:spPr>
+            <a:xfrm>
+              <a:off x="1155598" y="2628700"/>
+              <a:ext cx="1511402" cy="1164798"/>
+            </a:xfrm>
+            <a:prstGeom prst="rect">
+              <a:avLst/>
+            </a:prstGeom>
+            <a:solidFill>
+              <a:schemeClr val="bg1"/>
+            </a:solidFill>
+            <a:ln>
+              <a:noFill/>
+            </a:ln>
+          </p:spPr>
+          <p:style>
+            <a:lnRef idx="2">
+              <a:schemeClr val="accent1">
+                <a:shade val="50000"/>
+              </a:schemeClr>
+            </a:lnRef>
+            <a:fillRef idx="1">
+              <a:schemeClr val="accent1"/>
+            </a:fillRef>
+            <a:effectRef idx="0">
+              <a:schemeClr val="accent1"/>
+            </a:effectRef>
+            <a:fontRef idx="minor">
+              <a:schemeClr val="lt1"/>
+            </a:fontRef>
+          </p:style>
+          <p:txBody>
+            <a:bodyPr rtlCol="0" anchor="ctr"/>
+            <a:lstStyle/>
+            <a:p>
+              <a:pPr algn="ctr"/>
+              <a:endParaRPr lang="zh-TW" altLang="en-US"/>
+            </a:p>
+          </p:txBody>
+        </p:sp>
+        <p:grpSp>
+          <p:nvGrpSpPr>
+            <p:cNvPr id="34" name="群組 33"/>
+            <p:cNvGrpSpPr/>
+            <p:nvPr/>
+          </p:nvGrpSpPr>
+          <p:grpSpPr>
+            <a:xfrm>
+              <a:off x="1066801" y="2626549"/>
+              <a:ext cx="1695654" cy="1536281"/>
+              <a:chOff x="1141123" y="4728754"/>
+              <a:chExt cx="1695654" cy="1536281"/>
+            </a:xfrm>
+          </p:grpSpPr>
+          <p:pic>
+            <p:nvPicPr>
+              <p:cNvPr id="36" name="圖片 35"/>
+              <p:cNvPicPr>
+                <a:picLocks noChangeAspect="1"/>
+              </p:cNvPicPr>
+              <p:nvPr/>
+            </p:nvPicPr>
+            <p:blipFill>
+              <a:blip r:embed="rId4">
+                <a:extLst>
+                  <a:ext uri="{28A0092B-C50C-407E-A947-70E740481C1C}">
+                    <a14:useLocalDpi xmlns:a14="http://schemas.microsoft.com/office/drawing/2010/main" val="0"/>
+                  </a:ext>
+                </a:extLst>
+              </a:blip>
+              <a:stretch>
+                <a:fillRect/>
+              </a:stretch>
+            </p:blipFill>
+            <p:spPr>
+              <a:xfrm>
+                <a:off x="1541239" y="4974575"/>
+                <a:ext cx="895422" cy="895422"/>
+              </a:xfrm>
+              <a:prstGeom prst="rect">
+                <a:avLst/>
+              </a:prstGeom>
+            </p:spPr>
+          </p:pic>
+          <p:pic>
+            <p:nvPicPr>
+              <p:cNvPr id="37" name="圖片 36"/>
+              <p:cNvPicPr>
+                <a:picLocks noChangeAspect="1"/>
+              </p:cNvPicPr>
+              <p:nvPr/>
+            </p:nvPicPr>
+            <p:blipFill rotWithShape="1">
+              <a:blip r:embed="rId5">
+                <a:extLst>
+                  <a:ext uri="{28A0092B-C50C-407E-A947-70E740481C1C}">
+                    <a14:useLocalDpi xmlns:a14="http://schemas.microsoft.com/office/drawing/2010/main" val="0"/>
+                  </a:ext>
+                </a:extLst>
+              </a:blip>
+              <a:srcRect l="4494" t="15772" r="5630" b="15407"/>
+              <a:stretch/>
+            </p:blipFill>
+            <p:spPr>
+              <a:xfrm>
+                <a:off x="1217321" y="4728754"/>
+                <a:ext cx="1524001" cy="1166949"/>
+              </a:xfrm>
+              <a:prstGeom prst="rect">
+                <a:avLst/>
+              </a:prstGeom>
+            </p:spPr>
+          </p:pic>
+          <p:sp>
+            <p:nvSpPr>
+              <p:cNvPr id="38" name="文字方塊 37"/>
+              <p:cNvSpPr txBox="1"/>
+              <p:nvPr/>
+            </p:nvSpPr>
+            <p:spPr>
+              <a:xfrm>
+                <a:off x="1141123" y="5895703"/>
+                <a:ext cx="1695654" cy="369332"/>
+              </a:xfrm>
+              <a:prstGeom prst="rect">
+                <a:avLst/>
+              </a:prstGeom>
+              <a:noFill/>
+            </p:spPr>
+            <p:txBody>
+              <a:bodyPr wrap="square" rtlCol="0">
+                <a:spAutoFit/>
+              </a:bodyPr>
+              <a:lstStyle/>
+              <a:p>
+                <a:pPr algn="ctr"/>
+                <a:r>
+                  <a:rPr lang="en-US" altLang="zh-TW" dirty="0" smtClean="0"/>
+                  <a:t>User</a:t>
+                </a:r>
+                <a:endParaRPr lang="zh-TW" altLang="en-US" dirty="0"/>
+              </a:p>
+            </p:txBody>
+          </p:sp>
+        </p:grpSp>
+      </p:grpSp>
+      <p:pic>
+        <p:nvPicPr>
+          <p:cNvPr id="2" name="圖片 1"/>
+          <p:cNvPicPr>
+            <a:picLocks noChangeAspect="1"/>
+          </p:cNvPicPr>
+          <p:nvPr/>
+        </p:nvPicPr>
+        <p:blipFill>
+          <a:blip r:embed="rId6">
+            <a:extLst>
+              <a:ext uri="{28A0092B-C50C-407E-A947-70E740481C1C}">
+                <a14:useLocalDpi xmlns:a14="http://schemas.microsoft.com/office/drawing/2010/main" val="0"/>
+              </a:ext>
+            </a:extLst>
+          </a:blip>
+          <a:stretch>
+            <a:fillRect/>
+          </a:stretch>
+        </p:blipFill>
+        <p:spPr>
+          <a:xfrm>
+            <a:off x="379678" y="539464"/>
+            <a:ext cx="609600" cy="609600"/>
+          </a:xfrm>
+          <a:prstGeom prst="rect">
+            <a:avLst/>
+          </a:prstGeom>
+        </p:spPr>
+      </p:pic>
+      <p:cxnSp>
+        <p:nvCxnSpPr>
+          <p:cNvPr id="55" name="直線單箭頭接點 54"/>
+          <p:cNvCxnSpPr/>
+          <p:nvPr/>
+        </p:nvCxnSpPr>
+        <p:spPr>
+          <a:xfrm>
+            <a:off x="2669336" y="2361468"/>
+            <a:ext cx="1595280" cy="1829"/>
+          </a:xfrm>
+          <a:prstGeom prst="straightConnector1">
+            <a:avLst/>
+          </a:prstGeom>
+          <a:ln w="38100">
+            <a:solidFill>
+              <a:schemeClr val="tx1"/>
+            </a:solidFill>
+            <a:headEnd type="triangle" w="med" len="med"/>
+            <a:tailEnd type="none" w="med" len="med"/>
+          </a:ln>
+        </p:spPr>
+        <p:style>
+          <a:lnRef idx="1">
+            <a:schemeClr val="accent1"/>
+          </a:lnRef>
+          <a:fillRef idx="0">
+            <a:schemeClr val="accent1"/>
+          </a:fillRef>
+          <a:effectRef idx="0">
+            <a:schemeClr val="accent1"/>
+          </a:effectRef>
+          <a:fontRef idx="minor">
+            <a:schemeClr val="tx1"/>
+          </a:fontRef>
+        </p:style>
+      </p:cxnSp>
+      <p:cxnSp>
+        <p:nvCxnSpPr>
+          <p:cNvPr id="57" name="肘形接點 56"/>
+          <p:cNvCxnSpPr>
+            <a:stCxn id="37" idx="1"/>
+            <a:endCxn id="2" idx="2"/>
+          </p:cNvCxnSpPr>
+          <p:nvPr/>
+        </p:nvCxnSpPr>
+        <p:spPr>
+          <a:xfrm rot="10800000">
+            <a:off x="684478" y="1149064"/>
+            <a:ext cx="966500" cy="1027494"/>
+          </a:xfrm>
+          <a:prstGeom prst="bentConnector2">
+            <a:avLst/>
+          </a:prstGeom>
+          <a:ln w="38100">
+            <a:solidFill>
+              <a:schemeClr val="tx1"/>
+            </a:solidFill>
+            <a:tailEnd type="triangle"/>
+          </a:ln>
+        </p:spPr>
+        <p:style>
+          <a:lnRef idx="1">
+            <a:schemeClr val="accent1"/>
+          </a:lnRef>
+          <a:fillRef idx="0">
+            <a:schemeClr val="accent1"/>
+          </a:fillRef>
+          <a:effectRef idx="0">
+            <a:schemeClr val="accent1"/>
+          </a:effectRef>
+          <a:fontRef idx="minor">
+            <a:schemeClr val="tx1"/>
+          </a:fontRef>
+        </p:style>
+      </p:cxnSp>
+      <p:cxnSp>
+        <p:nvCxnSpPr>
+          <p:cNvPr id="68" name="肘形接點 67"/>
+          <p:cNvCxnSpPr>
+            <a:stCxn id="2" idx="3"/>
+            <a:endCxn id="37" idx="0"/>
+          </p:cNvCxnSpPr>
+          <p:nvPr/>
+        </p:nvCxnSpPr>
+        <p:spPr>
+          <a:xfrm>
+            <a:off x="989278" y="844264"/>
+            <a:ext cx="1175346" cy="938988"/>
+          </a:xfrm>
+          <a:prstGeom prst="bentConnector2">
+            <a:avLst/>
+          </a:prstGeom>
+          <a:ln w="38100">
+            <a:solidFill>
+              <a:schemeClr val="tx1"/>
+            </a:solidFill>
+            <a:tailEnd type="triangle"/>
+          </a:ln>
+        </p:spPr>
+        <p:style>
+          <a:lnRef idx="1">
+            <a:schemeClr val="accent1"/>
+          </a:lnRef>
+          <a:fillRef idx="0">
+            <a:schemeClr val="accent1"/>
+          </a:fillRef>
+          <a:effectRef idx="0">
+            <a:schemeClr val="accent1"/>
+          </a:effectRef>
+          <a:fontRef idx="minor">
+            <a:schemeClr val="tx1"/>
+          </a:fontRef>
+        </p:style>
+      </p:cxnSp>
+      <p:cxnSp>
+        <p:nvCxnSpPr>
+          <p:cNvPr id="72" name="直線單箭頭接點 71"/>
+          <p:cNvCxnSpPr/>
+          <p:nvPr/>
+        </p:nvCxnSpPr>
+        <p:spPr>
+          <a:xfrm>
+            <a:off x="2678270" y="2052859"/>
+            <a:ext cx="1595280" cy="1829"/>
+          </a:xfrm>
+          <a:prstGeom prst="straightConnector1">
+            <a:avLst/>
+          </a:prstGeom>
+          <a:ln w="38100">
+            <a:solidFill>
+              <a:schemeClr val="tx1"/>
+            </a:solidFill>
+            <a:headEnd type="none" w="med" len="med"/>
+            <a:tailEnd type="triangle" w="med" len="med"/>
+          </a:ln>
+        </p:spPr>
+        <p:style>
+          <a:lnRef idx="1">
+            <a:schemeClr val="accent1"/>
+          </a:lnRef>
+          <a:fillRef idx="0">
+            <a:schemeClr val="accent1"/>
+          </a:fillRef>
+          <a:effectRef idx="0">
+            <a:schemeClr val="accent1"/>
+          </a:effectRef>
+          <a:fontRef idx="minor">
+            <a:schemeClr val="tx1"/>
+          </a:fontRef>
+        </p:style>
+      </p:cxnSp>
+      <p:sp>
+        <p:nvSpPr>
+          <p:cNvPr id="74" name="橢圓 73"/>
+          <p:cNvSpPr/>
+          <p:nvPr/>
+        </p:nvSpPr>
+        <p:spPr>
+          <a:xfrm>
+            <a:off x="2763775" y="1704844"/>
+            <a:ext cx="213212" cy="213212"/>
+          </a:xfrm>
+          <a:prstGeom prst="ellipse">
+            <a:avLst/>
+          </a:prstGeom>
+        </p:spPr>
+        <p:style>
+          <a:lnRef idx="0">
+            <a:schemeClr val="accent2"/>
+          </a:lnRef>
+          <a:fillRef idx="3">
+            <a:schemeClr val="accent2"/>
+          </a:fillRef>
+          <a:effectRef idx="3">
+            <a:schemeClr val="accent2"/>
+          </a:effectRef>
+          <a:fontRef idx="minor">
+            <a:schemeClr val="lt1"/>
+          </a:fontRef>
+        </p:style>
+        <p:txBody>
+          <a:bodyPr rtlCol="0" anchor="ctr"/>
+          <a:lstStyle/>
+          <a:p>
+            <a:pPr algn="ctr"/>
+            <a:r>
+              <a:rPr lang="en-US" altLang="zh-TW" sz="1200" b="1" dirty="0" smtClean="0">
+                <a:ea typeface="微軟正黑體" panose="020B0604030504040204" pitchFamily="34" charset="-120"/>
+              </a:rPr>
+              <a:t>1</a:t>
+            </a:r>
+            <a:endParaRPr lang="zh-TW" altLang="en-US" sz="1200" b="1" dirty="0">
+              <a:ea typeface="微軟正黑體" panose="020B0604030504040204" pitchFamily="34" charset="-120"/>
+            </a:endParaRPr>
+          </a:p>
+        </p:txBody>
+      </p:sp>
+      <p:sp>
+        <p:nvSpPr>
+          <p:cNvPr id="75" name="橢圓 74"/>
+          <p:cNvSpPr/>
+          <p:nvPr/>
+        </p:nvSpPr>
+        <p:spPr>
+          <a:xfrm>
+            <a:off x="2781516" y="2456865"/>
+            <a:ext cx="213212" cy="213212"/>
+          </a:xfrm>
+          <a:prstGeom prst="ellipse">
+            <a:avLst/>
+          </a:prstGeom>
+        </p:spPr>
+        <p:style>
+          <a:lnRef idx="0">
+            <a:schemeClr val="accent2"/>
+          </a:lnRef>
+          <a:fillRef idx="3">
+            <a:schemeClr val="accent2"/>
+          </a:fillRef>
+          <a:effectRef idx="3">
+            <a:schemeClr val="accent2"/>
+          </a:effectRef>
+          <a:fontRef idx="minor">
+            <a:schemeClr val="lt1"/>
+          </a:fontRef>
+        </p:style>
+        <p:txBody>
+          <a:bodyPr rtlCol="0" anchor="ctr"/>
+          <a:lstStyle/>
+          <a:p>
+            <a:pPr algn="ctr"/>
+            <a:r>
+              <a:rPr lang="en-US" altLang="zh-TW" sz="1200" b="1" dirty="0" smtClean="0">
+                <a:ea typeface="微軟正黑體" panose="020B0604030504040204" pitchFamily="34" charset="-120"/>
+              </a:rPr>
+              <a:t>2</a:t>
+            </a:r>
+            <a:endParaRPr lang="zh-TW" altLang="en-US" sz="1200" b="1" dirty="0">
+              <a:ea typeface="微軟正黑體" panose="020B0604030504040204" pitchFamily="34" charset="-120"/>
+            </a:endParaRPr>
+          </a:p>
+        </p:txBody>
+      </p:sp>
+      <p:sp>
+        <p:nvSpPr>
+          <p:cNvPr id="76" name="橢圓 75"/>
+          <p:cNvSpPr/>
+          <p:nvPr/>
+        </p:nvSpPr>
+        <p:spPr>
+          <a:xfrm>
+            <a:off x="467243" y="2229666"/>
+            <a:ext cx="213212" cy="213212"/>
+          </a:xfrm>
+          <a:prstGeom prst="ellipse">
+            <a:avLst/>
+          </a:prstGeom>
+        </p:spPr>
+        <p:style>
+          <a:lnRef idx="0">
+            <a:schemeClr val="accent2"/>
+          </a:lnRef>
+          <a:fillRef idx="3">
+            <a:schemeClr val="accent2"/>
+          </a:fillRef>
+          <a:effectRef idx="3">
+            <a:schemeClr val="accent2"/>
+          </a:effectRef>
+          <a:fontRef idx="minor">
+            <a:schemeClr val="lt1"/>
+          </a:fontRef>
+        </p:style>
+        <p:txBody>
+          <a:bodyPr rtlCol="0" anchor="ctr"/>
+          <a:lstStyle/>
+          <a:p>
+            <a:pPr algn="ctr"/>
+            <a:r>
+              <a:rPr lang="en-US" altLang="zh-TW" sz="1200" b="1" dirty="0" smtClean="0">
+                <a:ea typeface="微軟正黑體" panose="020B0604030504040204" pitchFamily="34" charset="-120"/>
+              </a:rPr>
+              <a:t>3</a:t>
+            </a:r>
+            <a:endParaRPr lang="zh-TW" altLang="en-US" sz="1200" b="1" dirty="0">
+              <a:ea typeface="微軟正黑體" panose="020B0604030504040204" pitchFamily="34" charset="-120"/>
+            </a:endParaRPr>
+          </a:p>
+        </p:txBody>
+      </p:sp>
+      <p:sp>
+        <p:nvSpPr>
+          <p:cNvPr id="77" name="橢圓 76"/>
+          <p:cNvSpPr/>
+          <p:nvPr/>
+        </p:nvSpPr>
+        <p:spPr>
+          <a:xfrm>
+            <a:off x="1227179" y="372046"/>
+            <a:ext cx="213212" cy="213212"/>
+          </a:xfrm>
+          <a:prstGeom prst="ellipse">
+            <a:avLst/>
+          </a:prstGeom>
+        </p:spPr>
+        <p:style>
+          <a:lnRef idx="0">
+            <a:schemeClr val="accent2"/>
+          </a:lnRef>
+          <a:fillRef idx="3">
+            <a:schemeClr val="accent2"/>
+          </a:fillRef>
+          <a:effectRef idx="3">
+            <a:schemeClr val="accent2"/>
+          </a:effectRef>
+          <a:fontRef idx="minor">
+            <a:schemeClr val="lt1"/>
+          </a:fontRef>
+        </p:style>
+        <p:txBody>
+          <a:bodyPr rtlCol="0" anchor="ctr"/>
+          <a:lstStyle/>
+          <a:p>
+            <a:pPr algn="ctr"/>
+            <a:r>
+              <a:rPr lang="en-US" altLang="zh-TW" sz="1200" b="1" dirty="0">
+                <a:ea typeface="微軟正黑體" panose="020B0604030504040204" pitchFamily="34" charset="-120"/>
+              </a:rPr>
+              <a:t>4</a:t>
+            </a:r>
+            <a:endParaRPr lang="zh-TW" altLang="en-US" sz="1200" b="1" dirty="0">
+              <a:ea typeface="微軟正黑體" panose="020B0604030504040204" pitchFamily="34" charset="-120"/>
+            </a:endParaRPr>
+          </a:p>
+        </p:txBody>
+      </p:sp>
+      <p:sp>
+        <p:nvSpPr>
+          <p:cNvPr id="78" name="橢圓 77"/>
+          <p:cNvSpPr/>
+          <p:nvPr/>
+        </p:nvSpPr>
+        <p:spPr>
+          <a:xfrm>
+            <a:off x="989278" y="908839"/>
+            <a:ext cx="213212" cy="213212"/>
+          </a:xfrm>
+          <a:prstGeom prst="ellipse">
+            <a:avLst/>
+          </a:prstGeom>
+        </p:spPr>
+        <p:style>
+          <a:lnRef idx="0">
+            <a:schemeClr val="accent2"/>
+          </a:lnRef>
+          <a:fillRef idx="3">
+            <a:schemeClr val="accent2"/>
+          </a:fillRef>
+          <a:effectRef idx="3">
+            <a:schemeClr val="accent2"/>
+          </a:effectRef>
+          <a:fontRef idx="minor">
+            <a:schemeClr val="lt1"/>
+          </a:fontRef>
+        </p:style>
+        <p:txBody>
+          <a:bodyPr rtlCol="0" anchor="ctr"/>
+          <a:lstStyle/>
+          <a:p>
+            <a:pPr algn="ctr"/>
+            <a:r>
+              <a:rPr lang="en-US" altLang="zh-TW" sz="1200" b="1" dirty="0" smtClean="0">
+                <a:ea typeface="微軟正黑體" panose="020B0604030504040204" pitchFamily="34" charset="-120"/>
+              </a:rPr>
+              <a:t>5</a:t>
+            </a:r>
+            <a:endParaRPr lang="zh-TW" altLang="en-US" sz="1200" b="1" dirty="0">
+              <a:ea typeface="微軟正黑體" panose="020B0604030504040204" pitchFamily="34" charset="-120"/>
+            </a:endParaRPr>
+          </a:p>
+        </p:txBody>
+      </p:sp>
+      <p:sp>
+        <p:nvSpPr>
+          <p:cNvPr id="79" name="文字方塊 78"/>
+          <p:cNvSpPr txBox="1"/>
+          <p:nvPr/>
+        </p:nvSpPr>
+        <p:spPr>
+          <a:xfrm>
+            <a:off x="2923392" y="1675188"/>
+            <a:ext cx="1107996" cy="276999"/>
+          </a:xfrm>
+          <a:prstGeom prst="rect">
+            <a:avLst/>
+          </a:prstGeom>
+          <a:noFill/>
+        </p:spPr>
+        <p:txBody>
+          <a:bodyPr wrap="none" rtlCol="0">
+            <a:spAutoFit/>
+          </a:bodyPr>
+          <a:lstStyle/>
+          <a:p>
+            <a:pPr algn="ctr"/>
+            <a:r>
+              <a:rPr lang="zh-TW" altLang="en-US" sz="1200" dirty="0" smtClean="0">
+                <a:latin typeface="微軟正黑體" panose="020B0604030504040204" pitchFamily="34" charset="-120"/>
+                <a:ea typeface="微軟正黑體" panose="020B0604030504040204" pitchFamily="34" charset="-120"/>
+              </a:rPr>
+              <a:t>請</a:t>
+            </a:r>
+            <a:r>
+              <a:rPr lang="zh-TW" altLang="en-US" sz="1200" dirty="0">
+                <a:latin typeface="微軟正黑體" panose="020B0604030504040204" pitchFamily="34" charset="-120"/>
+                <a:ea typeface="微軟正黑體" panose="020B0604030504040204" pitchFamily="34" charset="-120"/>
+              </a:rPr>
+              <a:t>求</a:t>
+            </a:r>
+            <a:r>
+              <a:rPr lang="zh-TW" altLang="en-US" sz="1200" dirty="0" smtClean="0">
+                <a:latin typeface="微軟正黑體" panose="020B0604030504040204" pitchFamily="34" charset="-120"/>
+                <a:ea typeface="微軟正黑體" panose="020B0604030504040204" pitchFamily="34" charset="-120"/>
+              </a:rPr>
+              <a:t>網頁內容</a:t>
+            </a:r>
+            <a:endParaRPr lang="zh-TW" altLang="en-US" sz="1200" dirty="0">
+              <a:latin typeface="微軟正黑體" panose="020B0604030504040204" pitchFamily="34" charset="-120"/>
+              <a:ea typeface="微軟正黑體" panose="020B0604030504040204" pitchFamily="34" charset="-120"/>
+            </a:endParaRPr>
+          </a:p>
+        </p:txBody>
+      </p:sp>
+      <p:sp>
+        <p:nvSpPr>
+          <p:cNvPr id="80" name="文字方塊 79"/>
+          <p:cNvSpPr txBox="1"/>
+          <p:nvPr/>
+        </p:nvSpPr>
+        <p:spPr>
+          <a:xfrm>
+            <a:off x="2923392" y="2424971"/>
+            <a:ext cx="1107996" cy="276999"/>
+          </a:xfrm>
+          <a:prstGeom prst="rect">
+            <a:avLst/>
+          </a:prstGeom>
+          <a:noFill/>
+        </p:spPr>
+        <p:txBody>
+          <a:bodyPr wrap="none" rtlCol="0">
+            <a:spAutoFit/>
+          </a:bodyPr>
+          <a:lstStyle/>
+          <a:p>
+            <a:pPr algn="ctr"/>
+            <a:r>
+              <a:rPr lang="zh-TW" altLang="en-US" sz="1200" dirty="0" smtClean="0">
+                <a:latin typeface="微軟正黑體" panose="020B0604030504040204" pitchFamily="34" charset="-120"/>
+                <a:ea typeface="微軟正黑體" panose="020B0604030504040204" pitchFamily="34" charset="-120"/>
+              </a:rPr>
+              <a:t>取得網頁內容</a:t>
+            </a:r>
+            <a:endParaRPr lang="zh-TW" altLang="en-US" sz="1200" dirty="0">
+              <a:latin typeface="微軟正黑體" panose="020B0604030504040204" pitchFamily="34" charset="-120"/>
+              <a:ea typeface="微軟正黑體" panose="020B0604030504040204" pitchFamily="34" charset="-120"/>
+            </a:endParaRPr>
+          </a:p>
+        </p:txBody>
+      </p:sp>
+      <p:sp>
+        <p:nvSpPr>
+          <p:cNvPr id="81" name="文字方塊 80"/>
+          <p:cNvSpPr txBox="1"/>
+          <p:nvPr/>
+        </p:nvSpPr>
+        <p:spPr>
+          <a:xfrm>
+            <a:off x="628050" y="2204359"/>
+            <a:ext cx="954107" cy="276999"/>
+          </a:xfrm>
+          <a:prstGeom prst="rect">
+            <a:avLst/>
+          </a:prstGeom>
+          <a:noFill/>
+        </p:spPr>
+        <p:txBody>
+          <a:bodyPr wrap="none" rtlCol="0">
+            <a:spAutoFit/>
+          </a:bodyPr>
+          <a:lstStyle/>
+          <a:p>
+            <a:pPr algn="ctr"/>
+            <a:r>
+              <a:rPr lang="zh-TW" altLang="en-US" sz="1200" dirty="0" smtClean="0">
+                <a:latin typeface="微軟正黑體" panose="020B0604030504040204" pitchFamily="34" charset="-120"/>
+                <a:ea typeface="微軟正黑體" panose="020B0604030504040204" pitchFamily="34" charset="-120"/>
+              </a:rPr>
+              <a:t>存到</a:t>
+            </a:r>
+            <a:r>
+              <a:rPr lang="zh-TW" altLang="en-US" sz="1200" dirty="0"/>
+              <a:t>暫存</a:t>
+            </a:r>
+            <a:r>
+              <a:rPr lang="zh-TW" altLang="en-US" sz="1200" dirty="0" smtClean="0"/>
+              <a:t>區</a:t>
+            </a:r>
+            <a:endParaRPr lang="zh-TW" altLang="en-US" sz="1200" dirty="0"/>
+          </a:p>
+        </p:txBody>
+      </p:sp>
+      <p:sp>
+        <p:nvSpPr>
+          <p:cNvPr id="82" name="文字方塊 81"/>
+          <p:cNvSpPr txBox="1"/>
+          <p:nvPr/>
+        </p:nvSpPr>
+        <p:spPr>
+          <a:xfrm>
+            <a:off x="1290939" y="340985"/>
+            <a:ext cx="1604076" cy="276999"/>
+          </a:xfrm>
+          <a:prstGeom prst="rect">
+            <a:avLst/>
+          </a:prstGeom>
+          <a:noFill/>
+        </p:spPr>
+        <p:txBody>
+          <a:bodyPr wrap="square" rtlCol="0">
+            <a:spAutoFit/>
+          </a:bodyPr>
+          <a:lstStyle/>
+          <a:p>
+            <a:pPr algn="ctr"/>
+            <a:r>
+              <a:rPr lang="zh-TW" altLang="en-US" sz="1200" dirty="0" smtClean="0">
+                <a:latin typeface="微軟正黑體" panose="020B0604030504040204" pitchFamily="34" charset="-120"/>
+                <a:ea typeface="微軟正黑體" panose="020B0604030504040204" pitchFamily="34" charset="-120"/>
+              </a:rPr>
+              <a:t>再次請求網頁內容</a:t>
+            </a:r>
+            <a:endParaRPr lang="zh-TW" altLang="en-US" sz="1200" dirty="0">
+              <a:latin typeface="微軟正黑體" panose="020B0604030504040204" pitchFamily="34" charset="-120"/>
+              <a:ea typeface="微軟正黑體" panose="020B0604030504040204" pitchFamily="34" charset="-120"/>
+            </a:endParaRPr>
+          </a:p>
+        </p:txBody>
+      </p:sp>
+      <p:sp>
+        <p:nvSpPr>
+          <p:cNvPr id="83" name="文字方塊 82"/>
+          <p:cNvSpPr txBox="1"/>
+          <p:nvPr/>
+        </p:nvSpPr>
+        <p:spPr>
+          <a:xfrm>
+            <a:off x="1116778" y="888056"/>
+            <a:ext cx="1107996" cy="276999"/>
+          </a:xfrm>
+          <a:prstGeom prst="rect">
+            <a:avLst/>
+          </a:prstGeom>
+          <a:noFill/>
+        </p:spPr>
+        <p:txBody>
+          <a:bodyPr wrap="none" rtlCol="0">
+            <a:spAutoFit/>
+          </a:bodyPr>
+          <a:lstStyle/>
+          <a:p>
+            <a:pPr algn="ctr"/>
+            <a:r>
+              <a:rPr lang="zh-TW" altLang="en-US" sz="1200" dirty="0" smtClean="0"/>
+              <a:t>從暫</a:t>
+            </a:r>
+            <a:r>
+              <a:rPr lang="zh-TW" altLang="en-US" sz="1200" dirty="0"/>
+              <a:t>存</a:t>
+            </a:r>
+            <a:r>
+              <a:rPr lang="zh-TW" altLang="en-US" sz="1200" dirty="0" smtClean="0"/>
+              <a:t>區取出</a:t>
+            </a:r>
+            <a:endParaRPr lang="zh-TW" altLang="en-US" sz="1200" dirty="0"/>
+          </a:p>
+        </p:txBody>
+      </p:sp>
+      <p:grpSp>
+        <p:nvGrpSpPr>
+          <p:cNvPr id="138" name="群組 137"/>
+          <p:cNvGrpSpPr/>
+          <p:nvPr/>
+        </p:nvGrpSpPr>
+        <p:grpSpPr>
+          <a:xfrm>
+            <a:off x="1019201" y="3499921"/>
+            <a:ext cx="900000" cy="2604752"/>
+            <a:chOff x="2438400" y="1178074"/>
+            <a:chExt cx="1440000" cy="720000"/>
+          </a:xfrm>
+        </p:grpSpPr>
+        <p:sp>
+          <p:nvSpPr>
+            <p:cNvPr id="139" name="圓柱 138"/>
+            <p:cNvSpPr/>
+            <p:nvPr/>
+          </p:nvSpPr>
+          <p:spPr>
+            <a:xfrm rot="16200000">
+              <a:off x="2798400" y="818074"/>
+              <a:ext cx="720000" cy="1440000"/>
+            </a:xfrm>
+            <a:prstGeom prst="can">
+              <a:avLst/>
+            </a:prstGeom>
+          </p:spPr>
+          <p:style>
+            <a:lnRef idx="0">
+              <a:schemeClr val="accent5"/>
+            </a:lnRef>
+            <a:fillRef idx="3">
+              <a:schemeClr val="accent5"/>
+            </a:fillRef>
+            <a:effectRef idx="3">
+              <a:schemeClr val="accent5"/>
+            </a:effectRef>
+            <a:fontRef idx="minor">
+              <a:schemeClr val="lt1"/>
+            </a:fontRef>
+          </p:style>
+          <p:txBody>
+            <a:bodyPr rtlCol="0" anchor="ctr"/>
+            <a:lstStyle/>
+            <a:p>
+              <a:pPr algn="ctr"/>
+              <a:endParaRPr lang="zh-TW" altLang="en-US"/>
+            </a:p>
+          </p:txBody>
+        </p:sp>
+        <p:sp>
+          <p:nvSpPr>
+            <p:cNvPr id="140" name="矩形 139"/>
+            <p:cNvSpPr/>
+            <p:nvPr/>
+          </p:nvSpPr>
+          <p:spPr>
+            <a:xfrm rot="16200000">
+              <a:off x="2855551" y="1021010"/>
+              <a:ext cx="681900" cy="1034129"/>
+            </a:xfrm>
+            <a:prstGeom prst="rect">
+              <a:avLst/>
+            </a:prstGeom>
+          </p:spPr>
+          <p:txBody>
+            <a:bodyPr wrap="square" anchor="ctr">
+              <a:spAutoFit/>
+            </a:bodyPr>
+            <a:lstStyle/>
+            <a:p>
+              <a:pPr algn="ctr"/>
+              <a:r>
+                <a:rPr lang="en-US" altLang="zh-TW" dirty="0" smtClean="0">
+                  <a:solidFill>
+                    <a:schemeClr val="bg1"/>
+                  </a:solidFill>
+                </a:rPr>
+                <a:t>Response</a:t>
+              </a:r>
+              <a:r>
+                <a:rPr lang="zh-TW" altLang="en-US" dirty="0" smtClean="0">
+                  <a:solidFill>
+                    <a:schemeClr val="bg1"/>
+                  </a:solidFill>
+                </a:rPr>
+                <a:t> </a:t>
+              </a:r>
+              <a:r>
+                <a:rPr lang="en-US" altLang="zh-TW" dirty="0" smtClean="0">
+                  <a:solidFill>
+                    <a:schemeClr val="bg1"/>
+                  </a:solidFill>
+                </a:rPr>
+                <a:t>Caching</a:t>
+              </a:r>
+              <a:br>
+                <a:rPr lang="en-US" altLang="zh-TW" dirty="0" smtClean="0">
+                  <a:solidFill>
+                    <a:schemeClr val="bg1"/>
+                  </a:solidFill>
+                </a:rPr>
+              </a:br>
+              <a:r>
+                <a:rPr lang="en-US" altLang="zh-TW" dirty="0" smtClean="0">
+                  <a:solidFill>
+                    <a:schemeClr val="bg1"/>
+                  </a:solidFill>
+                </a:rPr>
+                <a:t>Middleware</a:t>
+              </a:r>
+              <a:endParaRPr lang="zh-TW" altLang="en-US" dirty="0">
+                <a:solidFill>
+                  <a:schemeClr val="bg1"/>
+                </a:solidFill>
+              </a:endParaRPr>
+            </a:p>
+          </p:txBody>
+        </p:sp>
+      </p:grpSp>
+      <p:sp>
+        <p:nvSpPr>
+          <p:cNvPr id="157" name="向右箭號 156"/>
+          <p:cNvSpPr/>
+          <p:nvPr/>
+        </p:nvSpPr>
+        <p:spPr>
+          <a:xfrm rot="10800000">
+            <a:off x="387011" y="5498596"/>
+            <a:ext cx="720000" cy="360000"/>
+          </a:xfrm>
+          <a:prstGeom prst="rightArrow">
+            <a:avLst/>
+          </a:prstGeom>
+        </p:spPr>
+        <p:style>
+          <a:lnRef idx="0">
+            <a:schemeClr val="accent2"/>
+          </a:lnRef>
+          <a:fillRef idx="3">
+            <a:schemeClr val="accent2"/>
+          </a:fillRef>
+          <a:effectRef idx="3">
+            <a:schemeClr val="accent2"/>
+          </a:effectRef>
+          <a:fontRef idx="minor">
+            <a:schemeClr val="lt1"/>
+          </a:fontRef>
+        </p:style>
+        <p:txBody>
+          <a:bodyPr rtlCol="0" anchor="ctr"/>
+          <a:lstStyle/>
+          <a:p>
+            <a:pPr algn="ctr"/>
+            <a:endParaRPr lang="zh-TW" altLang="en-US"/>
+          </a:p>
+        </p:txBody>
+      </p:sp>
+      <p:sp>
+        <p:nvSpPr>
+          <p:cNvPr id="158" name="向右箭號 157"/>
+          <p:cNvSpPr/>
+          <p:nvPr/>
+        </p:nvSpPr>
+        <p:spPr>
+          <a:xfrm>
+            <a:off x="402988" y="3959059"/>
+            <a:ext cx="720000" cy="360000"/>
+          </a:xfrm>
+          <a:prstGeom prst="rightArrow">
+            <a:avLst/>
+          </a:prstGeom>
+        </p:spPr>
+        <p:style>
+          <a:lnRef idx="0">
+            <a:schemeClr val="accent2"/>
+          </a:lnRef>
+          <a:fillRef idx="3">
+            <a:schemeClr val="accent2"/>
+          </a:fillRef>
+          <a:effectRef idx="3">
+            <a:schemeClr val="accent2"/>
+          </a:effectRef>
+          <a:fontRef idx="minor">
+            <a:schemeClr val="lt1"/>
+          </a:fontRef>
+        </p:style>
+        <p:txBody>
+          <a:bodyPr rtlCol="0" anchor="ctr"/>
+          <a:lstStyle/>
+          <a:p>
+            <a:pPr algn="ctr"/>
+            <a:endParaRPr lang="zh-TW" altLang="en-US"/>
+          </a:p>
+        </p:txBody>
+      </p:sp>
+      <p:sp>
+        <p:nvSpPr>
+          <p:cNvPr id="159" name="矩形 158"/>
+          <p:cNvSpPr/>
+          <p:nvPr/>
+        </p:nvSpPr>
+        <p:spPr>
+          <a:xfrm>
+            <a:off x="284722" y="3649405"/>
+            <a:ext cx="944297" cy="369332"/>
+          </a:xfrm>
+          <a:prstGeom prst="rect">
+            <a:avLst/>
+          </a:prstGeom>
+        </p:spPr>
+        <p:txBody>
+          <a:bodyPr wrap="none">
+            <a:spAutoFit/>
+          </a:bodyPr>
+          <a:lstStyle/>
+          <a:p>
+            <a:r>
+              <a:rPr lang="en-US" altLang="zh-TW" dirty="0"/>
+              <a:t>Request</a:t>
+            </a:r>
+            <a:endParaRPr lang="zh-TW" altLang="en-US" dirty="0"/>
+          </a:p>
+        </p:txBody>
+      </p:sp>
+      <p:sp>
+        <p:nvSpPr>
+          <p:cNvPr id="160" name="矩形 159"/>
+          <p:cNvSpPr/>
+          <p:nvPr/>
+        </p:nvSpPr>
+        <p:spPr>
+          <a:xfrm>
+            <a:off x="227012" y="5225193"/>
+            <a:ext cx="1081514" cy="369332"/>
+          </a:xfrm>
+          <a:prstGeom prst="rect">
+            <a:avLst/>
+          </a:prstGeom>
+        </p:spPr>
+        <p:txBody>
+          <a:bodyPr wrap="none">
+            <a:spAutoFit/>
+          </a:bodyPr>
+          <a:lstStyle/>
+          <a:p>
+            <a:r>
+              <a:rPr lang="en-US" altLang="zh-TW" dirty="0"/>
+              <a:t>Response</a:t>
+            </a:r>
+            <a:endParaRPr lang="zh-TW" altLang="en-US" dirty="0"/>
+          </a:p>
+        </p:txBody>
+      </p:sp>
+      <p:sp>
+        <p:nvSpPr>
+          <p:cNvPr id="162" name="矩形 161"/>
+          <p:cNvSpPr/>
+          <p:nvPr/>
+        </p:nvSpPr>
+        <p:spPr>
+          <a:xfrm rot="16200000">
+            <a:off x="1718051" y="3948027"/>
+            <a:ext cx="1603550" cy="720000"/>
+          </a:xfrm>
+          <a:prstGeom prst="rect">
+            <a:avLst/>
+          </a:prstGeom>
+        </p:spPr>
+        <p:style>
+          <a:lnRef idx="0">
+            <a:schemeClr val="accent5"/>
+          </a:lnRef>
+          <a:fillRef idx="3">
+            <a:schemeClr val="accent5"/>
+          </a:fillRef>
+          <a:effectRef idx="3">
+            <a:schemeClr val="accent5"/>
+          </a:effectRef>
+          <a:fontRef idx="minor">
+            <a:schemeClr val="lt1"/>
+          </a:fontRef>
+        </p:style>
+        <p:txBody>
+          <a:bodyPr rtlCol="0" anchor="ctr"/>
+          <a:lstStyle/>
+          <a:p>
+            <a:pPr algn="ctr"/>
+            <a:r>
+              <a:rPr lang="en-US" altLang="zh-TW" sz="1600" b="1" dirty="0" err="1" smtClean="0"/>
+              <a:t>Middlewares</a:t>
+            </a:r>
+            <a:endParaRPr lang="zh-TW" altLang="en-US" sz="1600" b="1" dirty="0"/>
+          </a:p>
+        </p:txBody>
+      </p:sp>
+      <p:sp>
+        <p:nvSpPr>
+          <p:cNvPr id="163" name="矩形 162"/>
+          <p:cNvSpPr/>
+          <p:nvPr/>
+        </p:nvSpPr>
+        <p:spPr>
+          <a:xfrm rot="16200000">
+            <a:off x="2878161" y="3948027"/>
+            <a:ext cx="1603550" cy="720000"/>
+          </a:xfrm>
+          <a:prstGeom prst="rect">
+            <a:avLst/>
+          </a:prstGeom>
+        </p:spPr>
+        <p:style>
+          <a:lnRef idx="1">
+            <a:schemeClr val="accent1"/>
+          </a:lnRef>
+          <a:fillRef idx="3">
+            <a:schemeClr val="accent1"/>
+          </a:fillRef>
+          <a:effectRef idx="2">
+            <a:schemeClr val="accent1"/>
+          </a:effectRef>
+          <a:fontRef idx="minor">
+            <a:schemeClr val="lt1"/>
+          </a:fontRef>
+        </p:style>
+        <p:txBody>
+          <a:bodyPr rtlCol="0" anchor="ctr"/>
+          <a:lstStyle/>
+          <a:p>
+            <a:pPr algn="ctr"/>
+            <a:r>
+              <a:rPr lang="en-US" altLang="zh-TW" sz="1600" b="1" dirty="0" smtClean="0"/>
+              <a:t>Action Filters</a:t>
+            </a:r>
+            <a:endParaRPr lang="zh-TW" altLang="en-US" sz="1600" b="1" dirty="0"/>
+          </a:p>
+        </p:txBody>
+      </p:sp>
+      <p:sp>
+        <p:nvSpPr>
+          <p:cNvPr id="164" name="矩形 163"/>
+          <p:cNvSpPr/>
+          <p:nvPr/>
+        </p:nvSpPr>
+        <p:spPr>
+          <a:xfrm rot="16200000">
+            <a:off x="4033484" y="3940118"/>
+            <a:ext cx="1603550" cy="720000"/>
+          </a:xfrm>
+          <a:prstGeom prst="rect">
+            <a:avLst/>
+          </a:prstGeom>
+        </p:spPr>
+        <p:style>
+          <a:lnRef idx="1">
+            <a:schemeClr val="accent6"/>
+          </a:lnRef>
+          <a:fillRef idx="3">
+            <a:schemeClr val="accent6"/>
+          </a:fillRef>
+          <a:effectRef idx="2">
+            <a:schemeClr val="accent6"/>
+          </a:effectRef>
+          <a:fontRef idx="minor">
+            <a:schemeClr val="lt1"/>
+          </a:fontRef>
+        </p:style>
+        <p:txBody>
+          <a:bodyPr rtlCol="0" anchor="ctr"/>
+          <a:lstStyle/>
+          <a:p>
+            <a:pPr algn="ctr"/>
+            <a:r>
+              <a:rPr lang="en-US" altLang="zh-TW" sz="1600" b="1" dirty="0" smtClean="0"/>
+              <a:t>Action</a:t>
+            </a:r>
+            <a:endParaRPr lang="zh-TW" altLang="en-US" sz="1600" b="1" dirty="0"/>
+          </a:p>
+        </p:txBody>
+      </p:sp>
+      <p:sp>
+        <p:nvSpPr>
+          <p:cNvPr id="173" name="向右箭號 172"/>
+          <p:cNvSpPr/>
+          <p:nvPr/>
+        </p:nvSpPr>
+        <p:spPr>
+          <a:xfrm rot="10800000">
+            <a:off x="2734237" y="4527247"/>
+            <a:ext cx="720000" cy="360000"/>
+          </a:xfrm>
+          <a:prstGeom prst="rightArrow">
+            <a:avLst/>
+          </a:prstGeom>
+        </p:spPr>
+        <p:style>
+          <a:lnRef idx="0">
+            <a:schemeClr val="accent2"/>
+          </a:lnRef>
+          <a:fillRef idx="3">
+            <a:schemeClr val="accent2"/>
+          </a:fillRef>
+          <a:effectRef idx="3">
+            <a:schemeClr val="accent2"/>
+          </a:effectRef>
+          <a:fontRef idx="minor">
+            <a:schemeClr val="lt1"/>
+          </a:fontRef>
+        </p:style>
+        <p:txBody>
+          <a:bodyPr rtlCol="0" anchor="ctr"/>
+          <a:lstStyle/>
+          <a:p>
+            <a:pPr algn="ctr"/>
+            <a:endParaRPr lang="zh-TW" altLang="en-US"/>
+          </a:p>
+        </p:txBody>
+      </p:sp>
+      <p:sp>
+        <p:nvSpPr>
+          <p:cNvPr id="174" name="向右箭號 173"/>
+          <p:cNvSpPr/>
+          <p:nvPr/>
+        </p:nvSpPr>
+        <p:spPr>
+          <a:xfrm>
+            <a:off x="2767064" y="3750831"/>
+            <a:ext cx="720000" cy="360000"/>
+          </a:xfrm>
+          <a:prstGeom prst="rightArrow">
+            <a:avLst/>
+          </a:prstGeom>
+        </p:spPr>
+        <p:style>
+          <a:lnRef idx="0">
+            <a:schemeClr val="accent2"/>
+          </a:lnRef>
+          <a:fillRef idx="3">
+            <a:schemeClr val="accent2"/>
+          </a:fillRef>
+          <a:effectRef idx="3">
+            <a:schemeClr val="accent2"/>
+          </a:effectRef>
+          <a:fontRef idx="minor">
+            <a:schemeClr val="lt1"/>
+          </a:fontRef>
+        </p:style>
+        <p:txBody>
+          <a:bodyPr rtlCol="0" anchor="ctr"/>
+          <a:lstStyle/>
+          <a:p>
+            <a:pPr algn="ctr"/>
+            <a:endParaRPr lang="zh-TW" altLang="en-US"/>
+          </a:p>
+        </p:txBody>
+      </p:sp>
+      <p:sp>
+        <p:nvSpPr>
+          <p:cNvPr id="175" name="向右箭號 174"/>
+          <p:cNvSpPr/>
+          <p:nvPr/>
+        </p:nvSpPr>
+        <p:spPr>
+          <a:xfrm rot="10800000">
+            <a:off x="3868074" y="4510136"/>
+            <a:ext cx="720000" cy="360000"/>
+          </a:xfrm>
+          <a:prstGeom prst="rightArrow">
+            <a:avLst/>
+          </a:prstGeom>
+        </p:spPr>
+        <p:style>
+          <a:lnRef idx="0">
+            <a:schemeClr val="accent2"/>
+          </a:lnRef>
+          <a:fillRef idx="3">
+            <a:schemeClr val="accent2"/>
+          </a:fillRef>
+          <a:effectRef idx="3">
+            <a:schemeClr val="accent2"/>
+          </a:effectRef>
+          <a:fontRef idx="minor">
+            <a:schemeClr val="lt1"/>
+          </a:fontRef>
+        </p:style>
+        <p:txBody>
+          <a:bodyPr rtlCol="0" anchor="ctr"/>
+          <a:lstStyle/>
+          <a:p>
+            <a:pPr algn="ctr"/>
+            <a:endParaRPr lang="zh-TW" altLang="en-US"/>
+          </a:p>
+        </p:txBody>
+      </p:sp>
+      <p:sp>
+        <p:nvSpPr>
+          <p:cNvPr id="176" name="向右箭號 175"/>
+          <p:cNvSpPr/>
+          <p:nvPr/>
+        </p:nvSpPr>
+        <p:spPr>
+          <a:xfrm>
+            <a:off x="3900901" y="3733720"/>
+            <a:ext cx="720000" cy="360000"/>
+          </a:xfrm>
+          <a:prstGeom prst="rightArrow">
+            <a:avLst/>
+          </a:prstGeom>
+        </p:spPr>
+        <p:style>
+          <a:lnRef idx="0">
+            <a:schemeClr val="accent2"/>
+          </a:lnRef>
+          <a:fillRef idx="3">
+            <a:schemeClr val="accent2"/>
+          </a:fillRef>
+          <a:effectRef idx="3">
+            <a:schemeClr val="accent2"/>
+          </a:effectRef>
+          <a:fontRef idx="minor">
+            <a:schemeClr val="lt1"/>
+          </a:fontRef>
+        </p:style>
+        <p:txBody>
+          <a:bodyPr rtlCol="0" anchor="ctr"/>
+          <a:lstStyle/>
+          <a:p>
+            <a:pPr algn="ctr"/>
+            <a:endParaRPr lang="zh-TW" altLang="en-US"/>
+          </a:p>
+        </p:txBody>
+      </p:sp>
+      <p:sp>
+        <p:nvSpPr>
+          <p:cNvPr id="177" name="向右箭號 176"/>
+          <p:cNvSpPr/>
+          <p:nvPr/>
+        </p:nvSpPr>
+        <p:spPr>
+          <a:xfrm rot="10800000">
+            <a:off x="1800835" y="4515796"/>
+            <a:ext cx="540000" cy="360000"/>
+          </a:xfrm>
+          <a:prstGeom prst="rightArrow">
+            <a:avLst/>
+          </a:prstGeom>
+        </p:spPr>
+        <p:style>
+          <a:lnRef idx="0">
+            <a:schemeClr val="accent2"/>
+          </a:lnRef>
+          <a:fillRef idx="3">
+            <a:schemeClr val="accent2"/>
+          </a:fillRef>
+          <a:effectRef idx="3">
+            <a:schemeClr val="accent2"/>
+          </a:effectRef>
+          <a:fontRef idx="minor">
+            <a:schemeClr val="lt1"/>
+          </a:fontRef>
+        </p:style>
+        <p:txBody>
+          <a:bodyPr rtlCol="0" anchor="ctr"/>
+          <a:lstStyle/>
+          <a:p>
+            <a:pPr algn="ctr"/>
+            <a:endParaRPr lang="zh-TW" altLang="en-US"/>
+          </a:p>
+        </p:txBody>
+      </p:sp>
+      <p:sp>
+        <p:nvSpPr>
+          <p:cNvPr id="178" name="向右箭號 177"/>
+          <p:cNvSpPr/>
+          <p:nvPr/>
+        </p:nvSpPr>
+        <p:spPr>
+          <a:xfrm>
+            <a:off x="1800835" y="3739380"/>
+            <a:ext cx="540000" cy="360000"/>
+          </a:xfrm>
+          <a:prstGeom prst="rightArrow">
+            <a:avLst/>
+          </a:prstGeom>
+        </p:spPr>
+        <p:style>
+          <a:lnRef idx="0">
+            <a:schemeClr val="accent2"/>
+          </a:lnRef>
+          <a:fillRef idx="3">
+            <a:schemeClr val="accent2"/>
+          </a:fillRef>
+          <a:effectRef idx="3">
+            <a:schemeClr val="accent2"/>
+          </a:effectRef>
+          <a:fontRef idx="minor">
+            <a:schemeClr val="lt1"/>
+          </a:fontRef>
+        </p:style>
+        <p:txBody>
+          <a:bodyPr rtlCol="0" anchor="ctr"/>
+          <a:lstStyle/>
+          <a:p>
+            <a:pPr algn="ctr"/>
+            <a:endParaRPr lang="zh-TW" altLang="en-US"/>
+          </a:p>
+        </p:txBody>
+      </p:sp>
+      <p:sp>
+        <p:nvSpPr>
+          <p:cNvPr id="179" name="向右箭號 178"/>
+          <p:cNvSpPr/>
+          <p:nvPr/>
+        </p:nvSpPr>
+        <p:spPr>
+          <a:xfrm rot="10800000">
+            <a:off x="1701945" y="5639697"/>
+            <a:ext cx="540000" cy="360000"/>
+          </a:xfrm>
+          <a:prstGeom prst="rightArrow">
+            <a:avLst/>
+          </a:prstGeom>
+        </p:spPr>
+        <p:style>
+          <a:lnRef idx="0">
+            <a:schemeClr val="accent4"/>
+          </a:lnRef>
+          <a:fillRef idx="3">
+            <a:schemeClr val="accent4"/>
+          </a:fillRef>
+          <a:effectRef idx="3">
+            <a:schemeClr val="accent4"/>
+          </a:effectRef>
+          <a:fontRef idx="minor">
+            <a:schemeClr val="lt1"/>
+          </a:fontRef>
+        </p:style>
+        <p:txBody>
+          <a:bodyPr rtlCol="0" anchor="ctr"/>
+          <a:lstStyle/>
+          <a:p>
+            <a:pPr algn="ctr"/>
+            <a:endParaRPr lang="zh-TW" altLang="en-US"/>
+          </a:p>
+        </p:txBody>
+      </p:sp>
+      <p:sp>
+        <p:nvSpPr>
+          <p:cNvPr id="180" name="向右箭號 179"/>
+          <p:cNvSpPr/>
+          <p:nvPr/>
+        </p:nvSpPr>
+        <p:spPr>
+          <a:xfrm>
+            <a:off x="1730497" y="5349619"/>
+            <a:ext cx="540000" cy="360000"/>
+          </a:xfrm>
+          <a:prstGeom prst="rightArrow">
+            <a:avLst/>
+          </a:prstGeom>
+        </p:spPr>
+        <p:style>
+          <a:lnRef idx="0">
+            <a:schemeClr val="accent4"/>
+          </a:lnRef>
+          <a:fillRef idx="3">
+            <a:schemeClr val="accent4"/>
+          </a:fillRef>
+          <a:effectRef idx="3">
+            <a:schemeClr val="accent4"/>
+          </a:effectRef>
+          <a:fontRef idx="minor">
+            <a:schemeClr val="lt1"/>
+          </a:fontRef>
+        </p:style>
+        <p:txBody>
+          <a:bodyPr rtlCol="0" anchor="ctr"/>
+          <a:lstStyle/>
+          <a:p>
+            <a:pPr algn="ctr"/>
+            <a:endParaRPr lang="zh-TW" altLang="en-US"/>
+          </a:p>
+        </p:txBody>
+      </p:sp>
+    </p:spTree>
+    <p:extLst>
+      <p:ext uri="{BB962C8B-B14F-4D97-AF65-F5344CB8AC3E}">
+        <p14:creationId xmlns:p14="http://schemas.microsoft.com/office/powerpoint/2010/main" val="2985661171"/>
+      </p:ext>
+    </p:extLst>
+  </p:cSld>
+  <p:clrMapOvr>
+    <a:masterClrMapping/>
+  </p:clrMapOvr>
+  <p:timing>
+    <p:tnLst>
+      <p:par>
+        <p:cTn id="1" dur="indefinite" restart="never" nodeType="tmRoot"/>
       </p:par>
     </p:tnLst>
   </p:timing>
@@ -37811,15 +39613,6 @@
 </file>
 
 <file path=customXml/item2.xml><?xml version="1.0" encoding="utf-8"?>
-<?mso-contentType ?>
-<FormTemplates xmlns="http://schemas.microsoft.com/sharepoint/v3/contenttype/forms">
-  <Display>DocumentLibraryForm</Display>
-  <Edit>DocumentLibraryForm</Edit>
-  <New>DocumentLibraryForm</New>
-</FormTemplates>
-</file>
-
-<file path=customXml/item3.xml><?xml version="1.0" encoding="utf-8"?>
 <ct:contentTypeSchema xmlns:ct="http://schemas.microsoft.com/office/2006/metadata/contentType" xmlns:ma="http://schemas.microsoft.com/office/2006/metadata/properties/metaAttributes" ct:_="" ma:_="" ma:contentTypeName="Document" ma:contentTypeID="0x0101000AA0115B54226D469CC0FAAE38E5F61C" ma:contentTypeVersion="3" ma:contentTypeDescription="Create a new document." ma:contentTypeScope="" ma:versionID="0ae424bb0065d3a2a055b165aca25ec5">
   <xsd:schema xmlns:xsd="http://www.w3.org/2001/XMLSchema" xmlns:p="http://schemas.microsoft.com/office/2006/metadata/properties" targetNamespace="http://schemas.microsoft.com/office/2006/metadata/properties" ma:root="true" ma:fieldsID="4aeb20c0e3442673af7ee10786458764">
     <xsd:element name="properties">
@@ -37868,6 +39661,15 @@
 </ct:contentTypeSchema>
 </file>
 
+<file path=customXml/item3.xml><?xml version="1.0" encoding="utf-8"?>
+<?mso-contentType ?>
+<FormTemplates xmlns="http://schemas.microsoft.com/sharepoint/v3/contenttype/forms">
+  <Display>DocumentLibraryForm</Display>
+  <Edit>DocumentLibraryForm</Edit>
+  <New>DocumentLibraryForm</New>
+</FormTemplates>
+</file>
+
 <file path=customXml/itemProps1.xml><?xml version="1.0" encoding="utf-8"?>
 <ds:datastoreItem xmlns:ds="http://schemas.openxmlformats.org/officeDocument/2006/customXml" ds:itemID="{892A9AA9-F261-48C5-9DFB-0929A9F0E540}">
   <ds:schemaRefs>
@@ -37883,14 +39685,6 @@
 </file>
 
 <file path=customXml/itemProps2.xml><?xml version="1.0" encoding="utf-8"?>
-<ds:datastoreItem xmlns:ds="http://schemas.openxmlformats.org/officeDocument/2006/customXml" ds:itemID="{A1770BF7-49D5-46D6-8B76-1D8AF290B450}">
-  <ds:schemaRefs>
-    <ds:schemaRef ds:uri="http://schemas.microsoft.com/sharepoint/v3/contenttype/forms"/>
-  </ds:schemaRefs>
-</ds:datastoreItem>
-</file>
-
-<file path=customXml/itemProps3.xml><?xml version="1.0" encoding="utf-8"?>
 <ds:datastoreItem xmlns:ds="http://schemas.openxmlformats.org/officeDocument/2006/customXml" ds:itemID="{FE6BB287-9CB7-4AA6-A5A5-8D1CE03643F3}">
   <ds:schemaRefs>
     <ds:schemaRef ds:uri="http://schemas.microsoft.com/office/2006/metadata/contentType"/>
@@ -37903,4 +39697,12 @@
     <ds:schemaRef ds:uri="http://schemas.microsoft.com/office/internal/2005/internalDocumentation"/>
   </ds:schemaRefs>
 </ds:datastoreItem>
+</file>
+
+<file path=customXml/itemProps3.xml><?xml version="1.0" encoding="utf-8"?>
+<ds:datastoreItem xmlns:ds="http://schemas.openxmlformats.org/officeDocument/2006/customXml" ds:itemID="{A1770BF7-49D5-46D6-8B76-1D8AF290B450}">
+  <ds:schemaRefs>
+    <ds:schemaRef ds:uri="http://schemas.microsoft.com/sharepoint/v3/contenttype/forms"/>
+  </ds:schemaRefs>
+</ds:datastoreItem>
 </file>
</xml_diff>